<commit_message>
Summary image was updated
</commit_message>
<xml_diff>
--- a/images/summary.pptx
+++ b/images/summary.pptx
@@ -7,7 +7,7 @@
   <p:sldIdLst>
     <p:sldId id="256" r:id="rId2"/>
   </p:sldIdLst>
-  <p:sldSz cx="7315200" cy="11887200"/>
+  <p:sldSz cx="9601200" cy="11887200"/>
   <p:notesSz cx="6858000" cy="9144000"/>
   <p:defaultTextStyle>
     <a:defPPr>
@@ -112,7 +112,7 @@
             <a:srgbClr val="A4A3A4"/>
           </p15:clr>
         </p15:guide>
-        <p15:guide id="2" pos="2304" userDrawn="1">
+        <p15:guide id="2" pos="3024" userDrawn="1">
           <p15:clr>
             <a:srgbClr val="A4A3A4"/>
           </p15:clr>
@@ -152,8 +152,8 @@
         </p:nvSpPr>
         <p:spPr>
           <a:xfrm>
-            <a:off x="548646" y="3692758"/>
-            <a:ext cx="6217919" cy="2548043"/>
+            <a:off x="720099" y="3692760"/>
+            <a:ext cx="8161019" cy="2548043"/>
           </a:xfrm>
         </p:spPr>
         <p:txBody>
@@ -180,8 +180,8 @@
         </p:nvSpPr>
         <p:spPr>
           <a:xfrm>
-            <a:off x="1097285" y="6736091"/>
-            <a:ext cx="5120641" cy="3037837"/>
+            <a:off x="1440188" y="6736093"/>
+            <a:ext cx="6720841" cy="3037837"/>
           </a:xfrm>
         </p:spPr>
         <p:txBody>
@@ -197,7 +197,7 @@
                 </a:solidFill>
               </a:defRPr>
             </a:lvl1pPr>
-            <a:lvl2pPr marL="2376845" indent="0" algn="ctr">
+            <a:lvl2pPr marL="3119609" indent="0" algn="ctr">
               <a:buNone/>
               <a:defRPr>
                 <a:solidFill>
@@ -207,7 +207,7 @@
                 </a:solidFill>
               </a:defRPr>
             </a:lvl2pPr>
-            <a:lvl3pPr marL="4753715" indent="0" algn="ctr">
+            <a:lvl3pPr marL="6239251" indent="0" algn="ctr">
               <a:buNone/>
               <a:defRPr>
                 <a:solidFill>
@@ -217,7 +217,7 @@
                 </a:solidFill>
               </a:defRPr>
             </a:lvl3pPr>
-            <a:lvl4pPr marL="7130560" indent="0" algn="ctr">
+            <a:lvl4pPr marL="9358860" indent="0" algn="ctr">
               <a:buNone/>
               <a:defRPr>
                 <a:solidFill>
@@ -227,7 +227,7 @@
                 </a:solidFill>
               </a:defRPr>
             </a:lvl4pPr>
-            <a:lvl5pPr marL="9507403" indent="0" algn="ctr">
+            <a:lvl5pPr marL="12478467" indent="0" algn="ctr">
               <a:buNone/>
               <a:defRPr>
                 <a:solidFill>
@@ -237,7 +237,7 @@
                 </a:solidFill>
               </a:defRPr>
             </a:lvl5pPr>
-            <a:lvl6pPr marL="11884279" indent="0" algn="ctr">
+            <a:lvl6pPr marL="15598116" indent="0" algn="ctr">
               <a:buNone/>
               <a:defRPr>
                 <a:solidFill>
@@ -247,7 +247,7 @@
                 </a:solidFill>
               </a:defRPr>
             </a:lvl6pPr>
-            <a:lvl7pPr marL="14261125" indent="0" algn="ctr">
+            <a:lvl7pPr marL="18717726" indent="0" algn="ctr">
               <a:buNone/>
               <a:defRPr>
                 <a:solidFill>
@@ -257,7 +257,7 @@
                 </a:solidFill>
               </a:defRPr>
             </a:lvl7pPr>
-            <a:lvl8pPr marL="16637993" indent="0" algn="ctr">
+            <a:lvl8pPr marL="21837366" indent="0" algn="ctr">
               <a:buNone/>
               <a:defRPr>
                 <a:solidFill>
@@ -267,7 +267,7 @@
                 </a:solidFill>
               </a:defRPr>
             </a:lvl8pPr>
-            <a:lvl9pPr marL="19014858" indent="0" algn="ctr">
+            <a:lvl9pPr marL="24957002" indent="0" algn="ctr">
               <a:buNone/>
               <a:defRPr>
                 <a:solidFill>
@@ -304,7 +304,7 @@
           <a:p>
             <a:fld id="{01197F44-DB72-474A-9754-31703E05C006}" type="datetimeFigureOut">
               <a:rPr lang="en-US" smtClean="0"/>
-              <a:t>10/17/19</a:t>
+              <a:t>10/19/19</a:t>
             </a:fld>
             <a:endParaRPr lang="en-US"/>
           </a:p>
@@ -474,7 +474,7 @@
           <a:p>
             <a:fld id="{01197F44-DB72-474A-9754-31703E05C006}" type="datetimeFigureOut">
               <a:rPr lang="en-US" smtClean="0"/>
-              <a:t>10/17/19</a:t>
+              <a:t>10/19/19</a:t>
             </a:fld>
             <a:endParaRPr lang="en-US"/>
           </a:p>
@@ -564,8 +564,8 @@
         </p:nvSpPr>
         <p:spPr>
           <a:xfrm>
-            <a:off x="5303522" y="476053"/>
-            <a:ext cx="1645920" cy="10142649"/>
+            <a:off x="6960873" y="476055"/>
+            <a:ext cx="2160270" cy="10142649"/>
           </a:xfrm>
         </p:spPr>
         <p:txBody>
@@ -592,8 +592,8 @@
         </p:nvSpPr>
         <p:spPr>
           <a:xfrm>
-            <a:off x="365765" y="476053"/>
-            <a:ext cx="4815840" cy="10142649"/>
+            <a:off x="480066" y="476055"/>
+            <a:ext cx="6320790" cy="10142649"/>
           </a:xfrm>
         </p:spPr>
         <p:txBody>
@@ -654,7 +654,7 @@
           <a:p>
             <a:fld id="{01197F44-DB72-474A-9754-31703E05C006}" type="datetimeFigureOut">
               <a:rPr lang="en-US" smtClean="0"/>
-              <a:t>10/17/19</a:t>
+              <a:t>10/19/19</a:t>
             </a:fld>
             <a:endParaRPr lang="en-US"/>
           </a:p>
@@ -824,7 +824,7 @@
           <a:p>
             <a:fld id="{01197F44-DB72-474A-9754-31703E05C006}" type="datetimeFigureOut">
               <a:rPr lang="en-US" smtClean="0"/>
-              <a:t>10/17/19</a:t>
+              <a:t>10/19/19</a:t>
             </a:fld>
             <a:endParaRPr lang="en-US"/>
           </a:p>
@@ -914,15 +914,15 @@
         </p:nvSpPr>
         <p:spPr>
           <a:xfrm>
-            <a:off x="577856" y="7638643"/>
-            <a:ext cx="6217919" cy="2360937"/>
+            <a:off x="758438" y="7638645"/>
+            <a:ext cx="8161019" cy="2360937"/>
           </a:xfrm>
         </p:spPr>
         <p:txBody>
           <a:bodyPr anchor="t"/>
           <a:lstStyle>
             <a:lvl1pPr algn="l">
-              <a:defRPr sz="21061" b="1" cap="all"/>
+              <a:defRPr sz="27642" b="1" cap="all"/>
             </a:lvl1pPr>
           </a:lstStyle>
           <a:p>
@@ -946,8 +946,8 @@
         </p:nvSpPr>
         <p:spPr>
           <a:xfrm>
-            <a:off x="577856" y="5038316"/>
-            <a:ext cx="6217919" cy="2600325"/>
+            <a:off x="758438" y="5038317"/>
+            <a:ext cx="8161019" cy="2600325"/>
           </a:xfrm>
         </p:spPr>
         <p:txBody>
@@ -955,7 +955,7 @@
           <a:lstStyle>
             <a:lvl1pPr marL="0" indent="0">
               <a:buNone/>
-              <a:defRPr sz="11238">
+              <a:defRPr sz="14750">
                 <a:solidFill>
                   <a:schemeClr val="tx1">
                     <a:tint val="75000"/>
@@ -963,9 +963,9 @@
                 </a:solidFill>
               </a:defRPr>
             </a:lvl1pPr>
-            <a:lvl2pPr marL="2376845" indent="0">
+            <a:lvl2pPr marL="3119609" indent="0">
               <a:buNone/>
-              <a:defRPr sz="9828">
+              <a:defRPr sz="12899">
                 <a:solidFill>
                   <a:schemeClr val="tx1">
                     <a:tint val="75000"/>
@@ -973,9 +973,9 @@
                 </a:solidFill>
               </a:defRPr>
             </a:lvl2pPr>
-            <a:lvl3pPr marL="4753715" indent="0">
+            <a:lvl3pPr marL="6239251" indent="0">
               <a:buNone/>
-              <a:defRPr sz="8424">
+              <a:defRPr sz="11057">
                 <a:solidFill>
                   <a:schemeClr val="tx1">
                     <a:tint val="75000"/>
@@ -983,9 +983,9 @@
                 </a:solidFill>
               </a:defRPr>
             </a:lvl3pPr>
-            <a:lvl4pPr marL="7130560" indent="0">
+            <a:lvl4pPr marL="9358860" indent="0">
               <a:buNone/>
-              <a:defRPr sz="7020">
+              <a:defRPr sz="9214">
                 <a:solidFill>
                   <a:schemeClr val="tx1">
                     <a:tint val="75000"/>
@@ -993,9 +993,9 @@
                 </a:solidFill>
               </a:defRPr>
             </a:lvl4pPr>
-            <a:lvl5pPr marL="9507403" indent="0">
+            <a:lvl5pPr marL="12478467" indent="0">
               <a:buNone/>
-              <a:defRPr sz="7020">
+              <a:defRPr sz="9214">
                 <a:solidFill>
                   <a:schemeClr val="tx1">
                     <a:tint val="75000"/>
@@ -1003,9 +1003,9 @@
                 </a:solidFill>
               </a:defRPr>
             </a:lvl5pPr>
-            <a:lvl6pPr marL="11884279" indent="0">
+            <a:lvl6pPr marL="15598116" indent="0">
               <a:buNone/>
-              <a:defRPr sz="7020">
+              <a:defRPr sz="9214">
                 <a:solidFill>
                   <a:schemeClr val="tx1">
                     <a:tint val="75000"/>
@@ -1013,9 +1013,9 @@
                 </a:solidFill>
               </a:defRPr>
             </a:lvl6pPr>
-            <a:lvl7pPr marL="14261125" indent="0">
+            <a:lvl7pPr marL="18717726" indent="0">
               <a:buNone/>
-              <a:defRPr sz="7020">
+              <a:defRPr sz="9214">
                 <a:solidFill>
                   <a:schemeClr val="tx1">
                     <a:tint val="75000"/>
@@ -1023,9 +1023,9 @@
                 </a:solidFill>
               </a:defRPr>
             </a:lvl7pPr>
-            <a:lvl8pPr marL="16637993" indent="0">
+            <a:lvl8pPr marL="21837366" indent="0">
               <a:buNone/>
-              <a:defRPr sz="7020">
+              <a:defRPr sz="9214">
                 <a:solidFill>
                   <a:schemeClr val="tx1">
                     <a:tint val="75000"/>
@@ -1033,9 +1033,9 @@
                 </a:solidFill>
               </a:defRPr>
             </a:lvl8pPr>
-            <a:lvl9pPr marL="19014858" indent="0">
+            <a:lvl9pPr marL="24957002" indent="0">
               <a:buNone/>
-              <a:defRPr sz="7020">
+              <a:defRPr sz="9214">
                 <a:solidFill>
                   <a:schemeClr val="tx1">
                     <a:tint val="75000"/>
@@ -1070,7 +1070,7 @@
           <a:p>
             <a:fld id="{01197F44-DB72-474A-9754-31703E05C006}" type="datetimeFigureOut">
               <a:rPr lang="en-US" smtClean="0"/>
-              <a:t>10/17/19</a:t>
+              <a:t>10/19/19</a:t>
             </a:fld>
             <a:endParaRPr lang="en-US"/>
           </a:p>
@@ -1183,39 +1183,39 @@
         </p:nvSpPr>
         <p:spPr>
           <a:xfrm>
-            <a:off x="365766" y="2773706"/>
-            <a:ext cx="3230881" cy="7845003"/>
+            <a:off x="480069" y="2773708"/>
+            <a:ext cx="4240531" cy="7845003"/>
           </a:xfrm>
         </p:spPr>
         <p:txBody>
           <a:bodyPr/>
           <a:lstStyle>
             <a:lvl1pPr>
-              <a:defRPr sz="15445"/>
+              <a:defRPr sz="20271"/>
             </a:lvl1pPr>
             <a:lvl2pPr>
-              <a:defRPr sz="12636"/>
+              <a:defRPr sz="16585"/>
             </a:lvl2pPr>
             <a:lvl3pPr>
-              <a:defRPr sz="11238"/>
+              <a:defRPr sz="14750"/>
             </a:lvl3pPr>
             <a:lvl4pPr>
-              <a:defRPr sz="9828"/>
+              <a:defRPr sz="12899"/>
             </a:lvl4pPr>
             <a:lvl5pPr>
-              <a:defRPr sz="9828"/>
+              <a:defRPr sz="12899"/>
             </a:lvl5pPr>
             <a:lvl6pPr>
-              <a:defRPr sz="9828"/>
+              <a:defRPr sz="12899"/>
             </a:lvl6pPr>
             <a:lvl7pPr>
-              <a:defRPr sz="9828"/>
+              <a:defRPr sz="12899"/>
             </a:lvl7pPr>
             <a:lvl8pPr>
-              <a:defRPr sz="9828"/>
+              <a:defRPr sz="12899"/>
             </a:lvl8pPr>
             <a:lvl9pPr>
-              <a:defRPr sz="9828"/>
+              <a:defRPr sz="12899"/>
             </a:lvl9pPr>
           </a:lstStyle>
           <a:p>
@@ -1268,39 +1268,39 @@
         </p:nvSpPr>
         <p:spPr>
           <a:xfrm>
-            <a:off x="3718566" y="2773706"/>
-            <a:ext cx="3230881" cy="7845003"/>
+            <a:off x="4880619" y="2773708"/>
+            <a:ext cx="4240531" cy="7845003"/>
           </a:xfrm>
         </p:spPr>
         <p:txBody>
           <a:bodyPr/>
           <a:lstStyle>
             <a:lvl1pPr>
-              <a:defRPr sz="15445"/>
+              <a:defRPr sz="20271"/>
             </a:lvl1pPr>
             <a:lvl2pPr>
-              <a:defRPr sz="12636"/>
+              <a:defRPr sz="16585"/>
             </a:lvl2pPr>
             <a:lvl3pPr>
-              <a:defRPr sz="11238"/>
+              <a:defRPr sz="14750"/>
             </a:lvl3pPr>
             <a:lvl4pPr>
-              <a:defRPr sz="9828"/>
+              <a:defRPr sz="12899"/>
             </a:lvl4pPr>
             <a:lvl5pPr>
-              <a:defRPr sz="9828"/>
+              <a:defRPr sz="12899"/>
             </a:lvl5pPr>
             <a:lvl6pPr>
-              <a:defRPr sz="9828"/>
+              <a:defRPr sz="12899"/>
             </a:lvl6pPr>
             <a:lvl7pPr>
-              <a:defRPr sz="9828"/>
+              <a:defRPr sz="12899"/>
             </a:lvl7pPr>
             <a:lvl8pPr>
-              <a:defRPr sz="9828"/>
+              <a:defRPr sz="12899"/>
             </a:lvl8pPr>
             <a:lvl9pPr>
-              <a:defRPr sz="9828"/>
+              <a:defRPr sz="12899"/>
             </a:lvl9pPr>
           </a:lstStyle>
           <a:p>
@@ -1358,7 +1358,7 @@
           <a:p>
             <a:fld id="{01197F44-DB72-474A-9754-31703E05C006}" type="datetimeFigureOut">
               <a:rPr lang="en-US" smtClean="0"/>
-              <a:t>10/17/19</a:t>
+              <a:t>10/19/19</a:t>
             </a:fld>
             <a:endParaRPr lang="en-US"/>
           </a:p>
@@ -1475,8 +1475,8 @@
         </p:nvSpPr>
         <p:spPr>
           <a:xfrm>
-            <a:off x="365769" y="2660876"/>
-            <a:ext cx="3232151" cy="1108917"/>
+            <a:off x="480073" y="2660878"/>
+            <a:ext cx="4242198" cy="1108917"/>
           </a:xfrm>
         </p:spPr>
         <p:txBody>
@@ -1484,39 +1484,39 @@
           <a:lstStyle>
             <a:lvl1pPr marL="0" indent="0">
               <a:buNone/>
-              <a:defRPr sz="12636" b="1"/>
+              <a:defRPr sz="16585" b="1"/>
             </a:lvl1pPr>
-            <a:lvl2pPr marL="2376845" indent="0">
+            <a:lvl2pPr marL="3119609" indent="0">
               <a:buNone/>
-              <a:defRPr sz="11238" b="1"/>
+              <a:defRPr sz="14750" b="1"/>
             </a:lvl2pPr>
-            <a:lvl3pPr marL="4753715" indent="0">
+            <a:lvl3pPr marL="6239251" indent="0">
               <a:buNone/>
-              <a:defRPr sz="9828" b="1"/>
+              <a:defRPr sz="12899" b="1"/>
             </a:lvl3pPr>
-            <a:lvl4pPr marL="7130560" indent="0">
+            <a:lvl4pPr marL="9358860" indent="0">
               <a:buNone/>
-              <a:defRPr sz="8424" b="1"/>
+              <a:defRPr sz="11057" b="1"/>
             </a:lvl4pPr>
-            <a:lvl5pPr marL="9507403" indent="0">
+            <a:lvl5pPr marL="12478467" indent="0">
               <a:buNone/>
-              <a:defRPr sz="8424" b="1"/>
+              <a:defRPr sz="11057" b="1"/>
             </a:lvl5pPr>
-            <a:lvl6pPr marL="11884279" indent="0">
+            <a:lvl6pPr marL="15598116" indent="0">
               <a:buNone/>
-              <a:defRPr sz="8424" b="1"/>
+              <a:defRPr sz="11057" b="1"/>
             </a:lvl6pPr>
-            <a:lvl7pPr marL="14261125" indent="0">
+            <a:lvl7pPr marL="18717726" indent="0">
               <a:buNone/>
-              <a:defRPr sz="8424" b="1"/>
+              <a:defRPr sz="11057" b="1"/>
             </a:lvl7pPr>
-            <a:lvl8pPr marL="16637993" indent="0">
+            <a:lvl8pPr marL="21837366" indent="0">
               <a:buNone/>
-              <a:defRPr sz="8424" b="1"/>
+              <a:defRPr sz="11057" b="1"/>
             </a:lvl8pPr>
-            <a:lvl9pPr marL="19014858" indent="0">
+            <a:lvl9pPr marL="24957002" indent="0">
               <a:buNone/>
-              <a:defRPr sz="8424" b="1"/>
+              <a:defRPr sz="11057" b="1"/>
             </a:lvl9pPr>
           </a:lstStyle>
           <a:p>
@@ -1540,39 +1540,39 @@
         </p:nvSpPr>
         <p:spPr>
           <a:xfrm>
-            <a:off x="365769" y="3769784"/>
-            <a:ext cx="3232151" cy="6848904"/>
+            <a:off x="480073" y="3769784"/>
+            <a:ext cx="4242198" cy="6848904"/>
           </a:xfrm>
         </p:spPr>
         <p:txBody>
           <a:bodyPr/>
           <a:lstStyle>
             <a:lvl1pPr>
-              <a:defRPr sz="12636"/>
+              <a:defRPr sz="16585"/>
             </a:lvl1pPr>
             <a:lvl2pPr>
-              <a:defRPr sz="11238"/>
+              <a:defRPr sz="14750"/>
             </a:lvl2pPr>
             <a:lvl3pPr>
-              <a:defRPr sz="9828"/>
+              <a:defRPr sz="12899"/>
             </a:lvl3pPr>
             <a:lvl4pPr>
-              <a:defRPr sz="8424"/>
+              <a:defRPr sz="11057"/>
             </a:lvl4pPr>
             <a:lvl5pPr>
-              <a:defRPr sz="8424"/>
+              <a:defRPr sz="11057"/>
             </a:lvl5pPr>
             <a:lvl6pPr>
-              <a:defRPr sz="8424"/>
+              <a:defRPr sz="11057"/>
             </a:lvl6pPr>
             <a:lvl7pPr>
-              <a:defRPr sz="8424"/>
+              <a:defRPr sz="11057"/>
             </a:lvl7pPr>
             <a:lvl8pPr>
-              <a:defRPr sz="8424"/>
+              <a:defRPr sz="11057"/>
             </a:lvl8pPr>
             <a:lvl9pPr>
-              <a:defRPr sz="8424"/>
+              <a:defRPr sz="11057"/>
             </a:lvl9pPr>
           </a:lstStyle>
           <a:p>
@@ -1625,8 +1625,8 @@
         </p:nvSpPr>
         <p:spPr>
           <a:xfrm>
-            <a:off x="3716025" y="2660876"/>
-            <a:ext cx="3233421" cy="1108917"/>
+            <a:off x="4877284" y="2660878"/>
+            <a:ext cx="4243865" cy="1108917"/>
           </a:xfrm>
         </p:spPr>
         <p:txBody>
@@ -1634,39 +1634,39 @@
           <a:lstStyle>
             <a:lvl1pPr marL="0" indent="0">
               <a:buNone/>
-              <a:defRPr sz="12636" b="1"/>
+              <a:defRPr sz="16585" b="1"/>
             </a:lvl1pPr>
-            <a:lvl2pPr marL="2376845" indent="0">
+            <a:lvl2pPr marL="3119609" indent="0">
               <a:buNone/>
-              <a:defRPr sz="11238" b="1"/>
+              <a:defRPr sz="14750" b="1"/>
             </a:lvl2pPr>
-            <a:lvl3pPr marL="4753715" indent="0">
+            <a:lvl3pPr marL="6239251" indent="0">
               <a:buNone/>
-              <a:defRPr sz="9828" b="1"/>
+              <a:defRPr sz="12899" b="1"/>
             </a:lvl3pPr>
-            <a:lvl4pPr marL="7130560" indent="0">
+            <a:lvl4pPr marL="9358860" indent="0">
               <a:buNone/>
-              <a:defRPr sz="8424" b="1"/>
+              <a:defRPr sz="11057" b="1"/>
             </a:lvl4pPr>
-            <a:lvl5pPr marL="9507403" indent="0">
+            <a:lvl5pPr marL="12478467" indent="0">
               <a:buNone/>
-              <a:defRPr sz="8424" b="1"/>
+              <a:defRPr sz="11057" b="1"/>
             </a:lvl5pPr>
-            <a:lvl6pPr marL="11884279" indent="0">
+            <a:lvl6pPr marL="15598116" indent="0">
               <a:buNone/>
-              <a:defRPr sz="8424" b="1"/>
+              <a:defRPr sz="11057" b="1"/>
             </a:lvl6pPr>
-            <a:lvl7pPr marL="14261125" indent="0">
+            <a:lvl7pPr marL="18717726" indent="0">
               <a:buNone/>
-              <a:defRPr sz="8424" b="1"/>
+              <a:defRPr sz="11057" b="1"/>
             </a:lvl7pPr>
-            <a:lvl8pPr marL="16637993" indent="0">
+            <a:lvl8pPr marL="21837366" indent="0">
               <a:buNone/>
-              <a:defRPr sz="8424" b="1"/>
+              <a:defRPr sz="11057" b="1"/>
             </a:lvl8pPr>
-            <a:lvl9pPr marL="19014858" indent="0">
+            <a:lvl9pPr marL="24957002" indent="0">
               <a:buNone/>
-              <a:defRPr sz="8424" b="1"/>
+              <a:defRPr sz="11057" b="1"/>
             </a:lvl9pPr>
           </a:lstStyle>
           <a:p>
@@ -1690,39 +1690,39 @@
         </p:nvSpPr>
         <p:spPr>
           <a:xfrm>
-            <a:off x="3716025" y="3769784"/>
-            <a:ext cx="3233421" cy="6848904"/>
+            <a:off x="4877284" y="3769784"/>
+            <a:ext cx="4243865" cy="6848904"/>
           </a:xfrm>
         </p:spPr>
         <p:txBody>
           <a:bodyPr/>
           <a:lstStyle>
             <a:lvl1pPr>
-              <a:defRPr sz="12636"/>
+              <a:defRPr sz="16585"/>
             </a:lvl1pPr>
             <a:lvl2pPr>
-              <a:defRPr sz="11238"/>
+              <a:defRPr sz="14750"/>
             </a:lvl2pPr>
             <a:lvl3pPr>
-              <a:defRPr sz="9828"/>
+              <a:defRPr sz="12899"/>
             </a:lvl3pPr>
             <a:lvl4pPr>
-              <a:defRPr sz="8424"/>
+              <a:defRPr sz="11057"/>
             </a:lvl4pPr>
             <a:lvl5pPr>
-              <a:defRPr sz="8424"/>
+              <a:defRPr sz="11057"/>
             </a:lvl5pPr>
             <a:lvl6pPr>
-              <a:defRPr sz="8424"/>
+              <a:defRPr sz="11057"/>
             </a:lvl6pPr>
             <a:lvl7pPr>
-              <a:defRPr sz="8424"/>
+              <a:defRPr sz="11057"/>
             </a:lvl7pPr>
             <a:lvl8pPr>
-              <a:defRPr sz="8424"/>
+              <a:defRPr sz="11057"/>
             </a:lvl8pPr>
             <a:lvl9pPr>
-              <a:defRPr sz="8424"/>
+              <a:defRPr sz="11057"/>
             </a:lvl9pPr>
           </a:lstStyle>
           <a:p>
@@ -1780,7 +1780,7 @@
           <a:p>
             <a:fld id="{01197F44-DB72-474A-9754-31703E05C006}" type="datetimeFigureOut">
               <a:rPr lang="en-US" smtClean="0"/>
-              <a:t>10/17/19</a:t>
+              <a:t>10/19/19</a:t>
             </a:fld>
             <a:endParaRPr lang="en-US"/>
           </a:p>
@@ -1898,7 +1898,7 @@
           <a:p>
             <a:fld id="{01197F44-DB72-474A-9754-31703E05C006}" type="datetimeFigureOut">
               <a:rPr lang="en-US" smtClean="0"/>
-              <a:t>10/17/19</a:t>
+              <a:t>10/19/19</a:t>
             </a:fld>
             <a:endParaRPr lang="en-US"/>
           </a:p>
@@ -1993,7 +1993,7 @@
           <a:p>
             <a:fld id="{01197F44-DB72-474A-9754-31703E05C006}" type="datetimeFigureOut">
               <a:rPr lang="en-US" smtClean="0"/>
-              <a:t>10/17/19</a:t>
+              <a:t>10/19/19</a:t>
             </a:fld>
             <a:endParaRPr lang="en-US"/>
           </a:p>
@@ -2083,15 +2083,15 @@
         </p:nvSpPr>
         <p:spPr>
           <a:xfrm>
-            <a:off x="365765" y="473302"/>
-            <a:ext cx="2406650" cy="2014217"/>
+            <a:off x="480067" y="473304"/>
+            <a:ext cx="3158729" cy="2014217"/>
           </a:xfrm>
         </p:spPr>
         <p:txBody>
           <a:bodyPr anchor="b"/>
           <a:lstStyle>
             <a:lvl1pPr algn="l">
-              <a:defRPr sz="11238" b="1"/>
+              <a:defRPr sz="14750" b="1"/>
             </a:lvl1pPr>
           </a:lstStyle>
           <a:p>
@@ -2115,39 +2115,39 @@
         </p:nvSpPr>
         <p:spPr>
           <a:xfrm>
-            <a:off x="2860047" y="473298"/>
-            <a:ext cx="4089401" cy="10145395"/>
+            <a:off x="3753813" y="473300"/>
+            <a:ext cx="5367339" cy="10145395"/>
           </a:xfrm>
         </p:spPr>
         <p:txBody>
           <a:bodyPr/>
           <a:lstStyle>
             <a:lvl1pPr>
-              <a:defRPr sz="18258"/>
+              <a:defRPr sz="23964"/>
             </a:lvl1pPr>
             <a:lvl2pPr>
-              <a:defRPr sz="15445"/>
+              <a:defRPr sz="20271"/>
             </a:lvl2pPr>
             <a:lvl3pPr>
-              <a:defRPr sz="12636"/>
+              <a:defRPr sz="16585"/>
             </a:lvl3pPr>
             <a:lvl4pPr>
-              <a:defRPr sz="11238"/>
+              <a:defRPr sz="14750"/>
             </a:lvl4pPr>
             <a:lvl5pPr>
-              <a:defRPr sz="11238"/>
+              <a:defRPr sz="14750"/>
             </a:lvl5pPr>
             <a:lvl6pPr>
-              <a:defRPr sz="11238"/>
+              <a:defRPr sz="14750"/>
             </a:lvl6pPr>
             <a:lvl7pPr>
-              <a:defRPr sz="11238"/>
+              <a:defRPr sz="14750"/>
             </a:lvl7pPr>
             <a:lvl8pPr>
-              <a:defRPr sz="11238"/>
+              <a:defRPr sz="14750"/>
             </a:lvl8pPr>
             <a:lvl9pPr>
-              <a:defRPr sz="11238"/>
+              <a:defRPr sz="14750"/>
             </a:lvl9pPr>
           </a:lstStyle>
           <a:p>
@@ -2200,8 +2200,8 @@
         </p:nvSpPr>
         <p:spPr>
           <a:xfrm>
-            <a:off x="365765" y="2487522"/>
-            <a:ext cx="2406650" cy="8131179"/>
+            <a:off x="480067" y="2487524"/>
+            <a:ext cx="3158729" cy="8131179"/>
           </a:xfrm>
         </p:spPr>
         <p:txBody>
@@ -2209,39 +2209,39 @@
           <a:lstStyle>
             <a:lvl1pPr marL="0" indent="0">
               <a:buNone/>
-              <a:defRPr sz="7020"/>
+              <a:defRPr sz="9214"/>
             </a:lvl1pPr>
-            <a:lvl2pPr marL="2376845" indent="0">
+            <a:lvl2pPr marL="3119609" indent="0">
               <a:buNone/>
-              <a:defRPr sz="5616"/>
+              <a:defRPr sz="7371"/>
             </a:lvl2pPr>
-            <a:lvl3pPr marL="4753715" indent="0">
+            <a:lvl3pPr marL="6239251" indent="0">
               <a:buNone/>
-              <a:defRPr sz="4212"/>
+              <a:defRPr sz="5528"/>
             </a:lvl3pPr>
-            <a:lvl4pPr marL="7130560" indent="0">
+            <a:lvl4pPr marL="9358860" indent="0">
               <a:buNone/>
-              <a:defRPr sz="4212"/>
+              <a:defRPr sz="5528"/>
             </a:lvl4pPr>
-            <a:lvl5pPr marL="9507403" indent="0">
+            <a:lvl5pPr marL="12478467" indent="0">
               <a:buNone/>
-              <a:defRPr sz="4212"/>
+              <a:defRPr sz="5528"/>
             </a:lvl5pPr>
-            <a:lvl6pPr marL="11884279" indent="0">
+            <a:lvl6pPr marL="15598116" indent="0">
               <a:buNone/>
-              <a:defRPr sz="4212"/>
+              <a:defRPr sz="5528"/>
             </a:lvl6pPr>
-            <a:lvl7pPr marL="14261125" indent="0">
+            <a:lvl7pPr marL="18717726" indent="0">
               <a:buNone/>
-              <a:defRPr sz="4212"/>
+              <a:defRPr sz="5528"/>
             </a:lvl7pPr>
-            <a:lvl8pPr marL="16637993" indent="0">
+            <a:lvl8pPr marL="21837366" indent="0">
               <a:buNone/>
-              <a:defRPr sz="4212"/>
+              <a:defRPr sz="5528"/>
             </a:lvl8pPr>
-            <a:lvl9pPr marL="19014858" indent="0">
+            <a:lvl9pPr marL="24957002" indent="0">
               <a:buNone/>
-              <a:defRPr sz="4212"/>
+              <a:defRPr sz="5528"/>
             </a:lvl9pPr>
           </a:lstStyle>
           <a:p>
@@ -2270,7 +2270,7 @@
           <a:p>
             <a:fld id="{01197F44-DB72-474A-9754-31703E05C006}" type="datetimeFigureOut">
               <a:rPr lang="en-US" smtClean="0"/>
-              <a:t>10/17/19</a:t>
+              <a:t>10/19/19</a:t>
             </a:fld>
             <a:endParaRPr lang="en-US"/>
           </a:p>
@@ -2360,15 +2360,15 @@
         </p:nvSpPr>
         <p:spPr>
           <a:xfrm>
-            <a:off x="1433834" y="8321058"/>
-            <a:ext cx="4389120" cy="982342"/>
+            <a:off x="1881908" y="8321058"/>
+            <a:ext cx="5760720" cy="982342"/>
           </a:xfrm>
         </p:spPr>
         <p:txBody>
           <a:bodyPr anchor="b"/>
           <a:lstStyle>
             <a:lvl1pPr algn="l">
-              <a:defRPr sz="11238" b="1"/>
+              <a:defRPr sz="14750" b="1"/>
             </a:lvl1pPr>
           </a:lstStyle>
           <a:p>
@@ -2392,8 +2392,8 @@
         </p:nvSpPr>
         <p:spPr>
           <a:xfrm>
-            <a:off x="1433834" y="1062146"/>
-            <a:ext cx="4389120" cy="7132320"/>
+            <a:off x="1881908" y="1062146"/>
+            <a:ext cx="5760720" cy="7132320"/>
           </a:xfrm>
         </p:spPr>
         <p:txBody>
@@ -2401,39 +2401,39 @@
           <a:lstStyle>
             <a:lvl1pPr marL="0" indent="0">
               <a:buNone/>
-              <a:defRPr sz="18258"/>
+              <a:defRPr sz="23964"/>
             </a:lvl1pPr>
-            <a:lvl2pPr marL="2376845" indent="0">
+            <a:lvl2pPr marL="3119609" indent="0">
               <a:buNone/>
-              <a:defRPr sz="15445"/>
+              <a:defRPr sz="20271"/>
             </a:lvl2pPr>
-            <a:lvl3pPr marL="4753715" indent="0">
+            <a:lvl3pPr marL="6239251" indent="0">
               <a:buNone/>
-              <a:defRPr sz="12636"/>
+              <a:defRPr sz="16585"/>
             </a:lvl3pPr>
-            <a:lvl4pPr marL="7130560" indent="0">
+            <a:lvl4pPr marL="9358860" indent="0">
               <a:buNone/>
-              <a:defRPr sz="11238"/>
+              <a:defRPr sz="14750"/>
             </a:lvl4pPr>
-            <a:lvl5pPr marL="9507403" indent="0">
+            <a:lvl5pPr marL="12478467" indent="0">
               <a:buNone/>
-              <a:defRPr sz="11238"/>
+              <a:defRPr sz="14750"/>
             </a:lvl5pPr>
-            <a:lvl6pPr marL="11884279" indent="0">
+            <a:lvl6pPr marL="15598116" indent="0">
               <a:buNone/>
-              <a:defRPr sz="11238"/>
+              <a:defRPr sz="14750"/>
             </a:lvl6pPr>
-            <a:lvl7pPr marL="14261125" indent="0">
+            <a:lvl7pPr marL="18717726" indent="0">
               <a:buNone/>
-              <a:defRPr sz="11238"/>
+              <a:defRPr sz="14750"/>
             </a:lvl7pPr>
-            <a:lvl8pPr marL="16637993" indent="0">
+            <a:lvl8pPr marL="21837366" indent="0">
               <a:buNone/>
-              <a:defRPr sz="11238"/>
+              <a:defRPr sz="14750"/>
             </a:lvl8pPr>
-            <a:lvl9pPr marL="19014858" indent="0">
+            <a:lvl9pPr marL="24957002" indent="0">
               <a:buNone/>
-              <a:defRPr sz="11238"/>
+              <a:defRPr sz="14750"/>
             </a:lvl9pPr>
           </a:lstStyle>
           <a:p>
@@ -2453,8 +2453,8 @@
         </p:nvSpPr>
         <p:spPr>
           <a:xfrm>
-            <a:off x="1433834" y="9303397"/>
-            <a:ext cx="4389120" cy="1395099"/>
+            <a:off x="1881908" y="9303399"/>
+            <a:ext cx="5760720" cy="1395099"/>
           </a:xfrm>
         </p:spPr>
         <p:txBody>
@@ -2462,39 +2462,39 @@
           <a:lstStyle>
             <a:lvl1pPr marL="0" indent="0">
               <a:buNone/>
-              <a:defRPr sz="7020"/>
+              <a:defRPr sz="9214"/>
             </a:lvl1pPr>
-            <a:lvl2pPr marL="2376845" indent="0">
+            <a:lvl2pPr marL="3119609" indent="0">
               <a:buNone/>
-              <a:defRPr sz="5616"/>
+              <a:defRPr sz="7371"/>
             </a:lvl2pPr>
-            <a:lvl3pPr marL="4753715" indent="0">
+            <a:lvl3pPr marL="6239251" indent="0">
               <a:buNone/>
-              <a:defRPr sz="4212"/>
+              <a:defRPr sz="5528"/>
             </a:lvl3pPr>
-            <a:lvl4pPr marL="7130560" indent="0">
+            <a:lvl4pPr marL="9358860" indent="0">
               <a:buNone/>
-              <a:defRPr sz="4212"/>
+              <a:defRPr sz="5528"/>
             </a:lvl4pPr>
-            <a:lvl5pPr marL="9507403" indent="0">
+            <a:lvl5pPr marL="12478467" indent="0">
               <a:buNone/>
-              <a:defRPr sz="4212"/>
+              <a:defRPr sz="5528"/>
             </a:lvl5pPr>
-            <a:lvl6pPr marL="11884279" indent="0">
+            <a:lvl6pPr marL="15598116" indent="0">
               <a:buNone/>
-              <a:defRPr sz="4212"/>
+              <a:defRPr sz="5528"/>
             </a:lvl6pPr>
-            <a:lvl7pPr marL="14261125" indent="0">
+            <a:lvl7pPr marL="18717726" indent="0">
               <a:buNone/>
-              <a:defRPr sz="4212"/>
+              <a:defRPr sz="5528"/>
             </a:lvl7pPr>
-            <a:lvl8pPr marL="16637993" indent="0">
+            <a:lvl8pPr marL="21837366" indent="0">
               <a:buNone/>
-              <a:defRPr sz="4212"/>
+              <a:defRPr sz="5528"/>
             </a:lvl8pPr>
-            <a:lvl9pPr marL="19014858" indent="0">
+            <a:lvl9pPr marL="24957002" indent="0">
               <a:buNone/>
-              <a:defRPr sz="4212"/>
+              <a:defRPr sz="5528"/>
             </a:lvl9pPr>
           </a:lstStyle>
           <a:p>
@@ -2523,7 +2523,7 @@
           <a:p>
             <a:fld id="{01197F44-DB72-474A-9754-31703E05C006}" type="datetimeFigureOut">
               <a:rPr lang="en-US" smtClean="0"/>
-              <a:t>10/17/19</a:t>
+              <a:t>10/19/19</a:t>
             </a:fld>
             <a:endParaRPr lang="en-US"/>
           </a:p>
@@ -2618,8 +2618,8 @@
         </p:nvSpPr>
         <p:spPr>
           <a:xfrm>
-            <a:off x="365765" y="476051"/>
-            <a:ext cx="6583681" cy="1981200"/>
+            <a:off x="480068" y="476051"/>
+            <a:ext cx="8641081" cy="1981200"/>
           </a:xfrm>
           <a:prstGeom prst="rect">
             <a:avLst/>
@@ -2651,8 +2651,8 @@
         </p:nvSpPr>
         <p:spPr>
           <a:xfrm>
-            <a:off x="365765" y="2773706"/>
-            <a:ext cx="6583681" cy="7845003"/>
+            <a:off x="480068" y="2773708"/>
+            <a:ext cx="8641081" cy="7845003"/>
           </a:xfrm>
           <a:prstGeom prst="rect">
             <a:avLst/>
@@ -2713,8 +2713,8 @@
         </p:nvSpPr>
         <p:spPr>
           <a:xfrm>
-            <a:off x="365760" y="11017686"/>
-            <a:ext cx="1706880" cy="632883"/>
+            <a:off x="480060" y="11017688"/>
+            <a:ext cx="2240280" cy="632883"/>
           </a:xfrm>
           <a:prstGeom prst="rect">
             <a:avLst/>
@@ -2724,7 +2724,7 @@
           <a:bodyPr vert="horz" lIns="67711" tIns="33854" rIns="67711" bIns="33854" rtlCol="0" anchor="ctr"/>
           <a:lstStyle>
             <a:lvl1pPr algn="l">
-              <a:defRPr sz="5616">
+              <a:defRPr sz="7371">
                 <a:solidFill>
                   <a:schemeClr val="tx1">
                     <a:tint val="75000"/>
@@ -2736,7 +2736,7 @@
           <a:p>
             <a:fld id="{01197F44-DB72-474A-9754-31703E05C006}" type="datetimeFigureOut">
               <a:rPr lang="en-US" smtClean="0"/>
-              <a:t>10/17/19</a:t>
+              <a:t>10/19/19</a:t>
             </a:fld>
             <a:endParaRPr lang="en-US"/>
           </a:p>
@@ -2754,8 +2754,8 @@
         </p:nvSpPr>
         <p:spPr>
           <a:xfrm>
-            <a:off x="2499360" y="11017686"/>
-            <a:ext cx="2316482" cy="632883"/>
+            <a:off x="3280411" y="11017688"/>
+            <a:ext cx="3040383" cy="632883"/>
           </a:xfrm>
           <a:prstGeom prst="rect">
             <a:avLst/>
@@ -2765,7 +2765,7 @@
           <a:bodyPr vert="horz" lIns="67711" tIns="33854" rIns="67711" bIns="33854" rtlCol="0" anchor="ctr"/>
           <a:lstStyle>
             <a:lvl1pPr algn="ctr">
-              <a:defRPr sz="5616">
+              <a:defRPr sz="7371">
                 <a:solidFill>
                   <a:schemeClr val="tx1">
                     <a:tint val="75000"/>
@@ -2791,8 +2791,8 @@
         </p:nvSpPr>
         <p:spPr>
           <a:xfrm>
-            <a:off x="5242560" y="11017686"/>
-            <a:ext cx="1706880" cy="632883"/>
+            <a:off x="6880860" y="11017688"/>
+            <a:ext cx="2240280" cy="632883"/>
           </a:xfrm>
           <a:prstGeom prst="rect">
             <a:avLst/>
@@ -2802,7 +2802,7 @@
           <a:bodyPr vert="horz" lIns="67711" tIns="33854" rIns="67711" bIns="33854" rtlCol="0" anchor="ctr"/>
           <a:lstStyle>
             <a:lvl1pPr algn="r">
-              <a:defRPr sz="5616">
+              <a:defRPr sz="7371">
                 <a:solidFill>
                   <a:schemeClr val="tx1">
                     <a:tint val="75000"/>
@@ -2843,12 +2843,12 @@
   </p:sldLayoutIdLst>
   <p:txStyles>
     <p:titleStyle>
-      <a:lvl1pPr algn="ctr" defTabSz="2376845" rtl="0" eaLnBrk="1" latinLnBrk="0" hangingPunct="1">
+      <a:lvl1pPr algn="ctr" defTabSz="3119609" rtl="0" eaLnBrk="1" latinLnBrk="0" hangingPunct="1">
         <a:spcBef>
           <a:spcPct val="0"/>
         </a:spcBef>
         <a:buNone/>
-        <a:defRPr sz="22465" kern="1200">
+        <a:defRPr sz="29485" kern="1200">
           <a:solidFill>
             <a:schemeClr val="tx1"/>
           </a:solidFill>
@@ -2859,13 +2859,13 @@
       </a:lvl1pPr>
     </p:titleStyle>
     <p:bodyStyle>
-      <a:lvl1pPr marL="1782631" indent="-1782631" algn="l" defTabSz="2376845" rtl="0" eaLnBrk="1" latinLnBrk="0" hangingPunct="1">
+      <a:lvl1pPr marL="2339703" indent="-2339703" algn="l" defTabSz="3119609" rtl="0" eaLnBrk="1" latinLnBrk="0" hangingPunct="1">
         <a:spcBef>
           <a:spcPct val="20000"/>
         </a:spcBef>
         <a:buFont typeface="Arial"/>
         <a:buChar char="•"/>
-        <a:defRPr sz="18258" kern="1200">
+        <a:defRPr sz="23964" kern="1200">
           <a:solidFill>
             <a:schemeClr val="tx1"/>
           </a:solidFill>
@@ -2874,13 +2874,13 @@
           <a:cs typeface="+mn-cs"/>
         </a:defRPr>
       </a:lvl1pPr>
-      <a:lvl2pPr marL="3862396" indent="-1485526" algn="l" defTabSz="2376845" rtl="0" eaLnBrk="1" latinLnBrk="0" hangingPunct="1">
+      <a:lvl2pPr marL="5069395" indent="-1949753" algn="l" defTabSz="3119609" rtl="0" eaLnBrk="1" latinLnBrk="0" hangingPunct="1">
         <a:spcBef>
           <a:spcPct val="20000"/>
         </a:spcBef>
         <a:buFont typeface="Arial"/>
         <a:buChar char="–"/>
-        <a:defRPr sz="15445" kern="1200">
+        <a:defRPr sz="20271" kern="1200">
           <a:solidFill>
             <a:schemeClr val="tx1"/>
           </a:solidFill>
@@ -2889,13 +2889,13 @@
           <a:cs typeface="+mn-cs"/>
         </a:defRPr>
       </a:lvl2pPr>
-      <a:lvl3pPr marL="5942140" indent="-1188411" algn="l" defTabSz="2376845" rtl="0" eaLnBrk="1" latinLnBrk="0" hangingPunct="1">
+      <a:lvl3pPr marL="7799059" indent="-1559790" algn="l" defTabSz="3119609" rtl="0" eaLnBrk="1" latinLnBrk="0" hangingPunct="1">
         <a:spcBef>
           <a:spcPct val="20000"/>
         </a:spcBef>
         <a:buFont typeface="Arial"/>
         <a:buChar char="•"/>
-        <a:defRPr sz="12636" kern="1200">
+        <a:defRPr sz="16585" kern="1200">
           <a:solidFill>
             <a:schemeClr val="tx1"/>
           </a:solidFill>
@@ -2904,13 +2904,13 @@
           <a:cs typeface="+mn-cs"/>
         </a:defRPr>
       </a:lvl3pPr>
-      <a:lvl4pPr marL="8318985" indent="-1188411" algn="l" defTabSz="2376845" rtl="0" eaLnBrk="1" latinLnBrk="0" hangingPunct="1">
+      <a:lvl4pPr marL="10918668" indent="-1559790" algn="l" defTabSz="3119609" rtl="0" eaLnBrk="1" latinLnBrk="0" hangingPunct="1">
         <a:spcBef>
           <a:spcPct val="20000"/>
         </a:spcBef>
         <a:buFont typeface="Arial"/>
         <a:buChar char="–"/>
-        <a:defRPr sz="11238" kern="1200">
+        <a:defRPr sz="14750" kern="1200">
           <a:solidFill>
             <a:schemeClr val="tx1"/>
           </a:solidFill>
@@ -2919,13 +2919,13 @@
           <a:cs typeface="+mn-cs"/>
         </a:defRPr>
       </a:lvl4pPr>
-      <a:lvl5pPr marL="10695856" indent="-1188411" algn="l" defTabSz="2376845" rtl="0" eaLnBrk="1" latinLnBrk="0" hangingPunct="1">
+      <a:lvl5pPr marL="14038311" indent="-1559790" algn="l" defTabSz="3119609" rtl="0" eaLnBrk="1" latinLnBrk="0" hangingPunct="1">
         <a:spcBef>
           <a:spcPct val="20000"/>
         </a:spcBef>
         <a:buFont typeface="Arial"/>
         <a:buChar char="»"/>
-        <a:defRPr sz="11238" kern="1200">
+        <a:defRPr sz="14750" kern="1200">
           <a:solidFill>
             <a:schemeClr val="tx1"/>
           </a:solidFill>
@@ -2934,13 +2934,13 @@
           <a:cs typeface="+mn-cs"/>
         </a:defRPr>
       </a:lvl5pPr>
-      <a:lvl6pPr marL="13072717" indent="-1188411" algn="l" defTabSz="2376845" rtl="0" eaLnBrk="1" latinLnBrk="0" hangingPunct="1">
+      <a:lvl6pPr marL="17157941" indent="-1559790" algn="l" defTabSz="3119609" rtl="0" eaLnBrk="1" latinLnBrk="0" hangingPunct="1">
         <a:spcBef>
           <a:spcPct val="20000"/>
         </a:spcBef>
         <a:buFont typeface="Arial"/>
         <a:buChar char="•"/>
-        <a:defRPr sz="11238" kern="1200">
+        <a:defRPr sz="14750" kern="1200">
           <a:solidFill>
             <a:schemeClr val="tx1"/>
           </a:solidFill>
@@ -2949,13 +2949,13 @@
           <a:cs typeface="+mn-cs"/>
         </a:defRPr>
       </a:lvl6pPr>
-      <a:lvl7pPr marL="15449575" indent="-1188411" algn="l" defTabSz="2376845" rtl="0" eaLnBrk="1" latinLnBrk="0" hangingPunct="1">
+      <a:lvl7pPr marL="20277567" indent="-1559790" algn="l" defTabSz="3119609" rtl="0" eaLnBrk="1" latinLnBrk="0" hangingPunct="1">
         <a:spcBef>
           <a:spcPct val="20000"/>
         </a:spcBef>
         <a:buFont typeface="Arial"/>
         <a:buChar char="•"/>
-        <a:defRPr sz="11238" kern="1200">
+        <a:defRPr sz="14750" kern="1200">
           <a:solidFill>
             <a:schemeClr val="tx1"/>
           </a:solidFill>
@@ -2964,13 +2964,13 @@
           <a:cs typeface="+mn-cs"/>
         </a:defRPr>
       </a:lvl7pPr>
-      <a:lvl8pPr marL="17826420" indent="-1188411" algn="l" defTabSz="2376845" rtl="0" eaLnBrk="1" latinLnBrk="0" hangingPunct="1">
+      <a:lvl8pPr marL="23397176" indent="-1559790" algn="l" defTabSz="3119609" rtl="0" eaLnBrk="1" latinLnBrk="0" hangingPunct="1">
         <a:spcBef>
           <a:spcPct val="20000"/>
         </a:spcBef>
         <a:buFont typeface="Arial"/>
         <a:buChar char="•"/>
-        <a:defRPr sz="11238" kern="1200">
+        <a:defRPr sz="14750" kern="1200">
           <a:solidFill>
             <a:schemeClr val="tx1"/>
           </a:solidFill>
@@ -2979,13 +2979,13 @@
           <a:cs typeface="+mn-cs"/>
         </a:defRPr>
       </a:lvl8pPr>
-      <a:lvl9pPr marL="20203283" indent="-1188411" algn="l" defTabSz="2376845" rtl="0" eaLnBrk="1" latinLnBrk="0" hangingPunct="1">
+      <a:lvl9pPr marL="26516809" indent="-1559790" algn="l" defTabSz="3119609" rtl="0" eaLnBrk="1" latinLnBrk="0" hangingPunct="1">
         <a:spcBef>
           <a:spcPct val="20000"/>
         </a:spcBef>
         <a:buFont typeface="Arial"/>
         <a:buChar char="•"/>
-        <a:defRPr sz="11238" kern="1200">
+        <a:defRPr sz="14750" kern="1200">
           <a:solidFill>
             <a:schemeClr val="tx1"/>
           </a:solidFill>
@@ -2999,8 +2999,8 @@
       <a:defPPr>
         <a:defRPr lang="en-US"/>
       </a:defPPr>
-      <a:lvl1pPr marL="0" algn="l" defTabSz="2376845" rtl="0" eaLnBrk="1" latinLnBrk="0" hangingPunct="1">
-        <a:defRPr sz="9828" kern="1200">
+      <a:lvl1pPr marL="0" algn="l" defTabSz="3119609" rtl="0" eaLnBrk="1" latinLnBrk="0" hangingPunct="1">
+        <a:defRPr sz="12899" kern="1200">
           <a:solidFill>
             <a:schemeClr val="tx1"/>
           </a:solidFill>
@@ -3009,8 +3009,8 @@
           <a:cs typeface="+mn-cs"/>
         </a:defRPr>
       </a:lvl1pPr>
-      <a:lvl2pPr marL="2376845" algn="l" defTabSz="2376845" rtl="0" eaLnBrk="1" latinLnBrk="0" hangingPunct="1">
-        <a:defRPr sz="9828" kern="1200">
+      <a:lvl2pPr marL="3119609" algn="l" defTabSz="3119609" rtl="0" eaLnBrk="1" latinLnBrk="0" hangingPunct="1">
+        <a:defRPr sz="12899" kern="1200">
           <a:solidFill>
             <a:schemeClr val="tx1"/>
           </a:solidFill>
@@ -3019,8 +3019,8 @@
           <a:cs typeface="+mn-cs"/>
         </a:defRPr>
       </a:lvl2pPr>
-      <a:lvl3pPr marL="4753715" algn="l" defTabSz="2376845" rtl="0" eaLnBrk="1" latinLnBrk="0" hangingPunct="1">
-        <a:defRPr sz="9828" kern="1200">
+      <a:lvl3pPr marL="6239251" algn="l" defTabSz="3119609" rtl="0" eaLnBrk="1" latinLnBrk="0" hangingPunct="1">
+        <a:defRPr sz="12899" kern="1200">
           <a:solidFill>
             <a:schemeClr val="tx1"/>
           </a:solidFill>
@@ -3029,8 +3029,8 @@
           <a:cs typeface="+mn-cs"/>
         </a:defRPr>
       </a:lvl3pPr>
-      <a:lvl4pPr marL="7130560" algn="l" defTabSz="2376845" rtl="0" eaLnBrk="1" latinLnBrk="0" hangingPunct="1">
-        <a:defRPr sz="9828" kern="1200">
+      <a:lvl4pPr marL="9358860" algn="l" defTabSz="3119609" rtl="0" eaLnBrk="1" latinLnBrk="0" hangingPunct="1">
+        <a:defRPr sz="12899" kern="1200">
           <a:solidFill>
             <a:schemeClr val="tx1"/>
           </a:solidFill>
@@ -3039,8 +3039,8 @@
           <a:cs typeface="+mn-cs"/>
         </a:defRPr>
       </a:lvl4pPr>
-      <a:lvl5pPr marL="9507403" algn="l" defTabSz="2376845" rtl="0" eaLnBrk="1" latinLnBrk="0" hangingPunct="1">
-        <a:defRPr sz="9828" kern="1200">
+      <a:lvl5pPr marL="12478467" algn="l" defTabSz="3119609" rtl="0" eaLnBrk="1" latinLnBrk="0" hangingPunct="1">
+        <a:defRPr sz="12899" kern="1200">
           <a:solidFill>
             <a:schemeClr val="tx1"/>
           </a:solidFill>
@@ -3049,8 +3049,8 @@
           <a:cs typeface="+mn-cs"/>
         </a:defRPr>
       </a:lvl5pPr>
-      <a:lvl6pPr marL="11884279" algn="l" defTabSz="2376845" rtl="0" eaLnBrk="1" latinLnBrk="0" hangingPunct="1">
-        <a:defRPr sz="9828" kern="1200">
+      <a:lvl6pPr marL="15598116" algn="l" defTabSz="3119609" rtl="0" eaLnBrk="1" latinLnBrk="0" hangingPunct="1">
+        <a:defRPr sz="12899" kern="1200">
           <a:solidFill>
             <a:schemeClr val="tx1"/>
           </a:solidFill>
@@ -3059,8 +3059,8 @@
           <a:cs typeface="+mn-cs"/>
         </a:defRPr>
       </a:lvl6pPr>
-      <a:lvl7pPr marL="14261125" algn="l" defTabSz="2376845" rtl="0" eaLnBrk="1" latinLnBrk="0" hangingPunct="1">
-        <a:defRPr sz="9828" kern="1200">
+      <a:lvl7pPr marL="18717726" algn="l" defTabSz="3119609" rtl="0" eaLnBrk="1" latinLnBrk="0" hangingPunct="1">
+        <a:defRPr sz="12899" kern="1200">
           <a:solidFill>
             <a:schemeClr val="tx1"/>
           </a:solidFill>
@@ -3069,8 +3069,8 @@
           <a:cs typeface="+mn-cs"/>
         </a:defRPr>
       </a:lvl7pPr>
-      <a:lvl8pPr marL="16637993" algn="l" defTabSz="2376845" rtl="0" eaLnBrk="1" latinLnBrk="0" hangingPunct="1">
-        <a:defRPr sz="9828" kern="1200">
+      <a:lvl8pPr marL="21837366" algn="l" defTabSz="3119609" rtl="0" eaLnBrk="1" latinLnBrk="0" hangingPunct="1">
+        <a:defRPr sz="12899" kern="1200">
           <a:solidFill>
             <a:schemeClr val="tx1"/>
           </a:solidFill>
@@ -3079,8 +3079,8 @@
           <a:cs typeface="+mn-cs"/>
         </a:defRPr>
       </a:lvl8pPr>
-      <a:lvl9pPr marL="19014858" algn="l" defTabSz="2376845" rtl="0" eaLnBrk="1" latinLnBrk="0" hangingPunct="1">
-        <a:defRPr sz="9828" kern="1200">
+      <a:lvl9pPr marL="24957002" algn="l" defTabSz="3119609" rtl="0" eaLnBrk="1" latinLnBrk="0" hangingPunct="1">
+        <a:defRPr sz="12899" kern="1200">
           <a:solidFill>
             <a:schemeClr val="tx1"/>
           </a:solidFill>
@@ -3119,7 +3119,7 @@
         </p:nvGrpSpPr>
         <p:grpSpPr>
           <a:xfrm>
-            <a:off x="1042352" y="248718"/>
+            <a:off x="1509280" y="248718"/>
             <a:ext cx="1605943" cy="685468"/>
             <a:chOff x="-9100066" y="4622491"/>
             <a:chExt cx="1605943" cy="685468"/>
@@ -3242,7 +3242,7 @@
         </p:nvGrpSpPr>
         <p:grpSpPr>
           <a:xfrm>
-            <a:off x="5168160" y="190834"/>
+            <a:off x="5635088" y="190834"/>
             <a:ext cx="1710478" cy="731881"/>
             <a:chOff x="-6933450" y="4584444"/>
             <a:chExt cx="1710478" cy="731881"/>
@@ -3392,7 +3392,7 @@
         </p:nvCxnSpPr>
         <p:spPr>
           <a:xfrm>
-            <a:off x="246728" y="3471029"/>
+            <a:off x="713656" y="3471029"/>
             <a:ext cx="4976625" cy="0"/>
           </a:xfrm>
           <a:prstGeom prst="line">
@@ -3429,14 +3429,14 @@
           <p:nvPr>
             <p:extLst>
               <p:ext uri="{D42A27DB-BD31-4B8C-83A1-F6EECF244321}">
-                <p14:modId xmlns:p14="http://schemas.microsoft.com/office/powerpoint/2010/main" val="1655037271"/>
+                <p14:modId xmlns:p14="http://schemas.microsoft.com/office/powerpoint/2010/main" val="1506163663"/>
               </p:ext>
             </p:extLst>
           </p:nvPr>
         </p:nvGraphicFramePr>
         <p:xfrm>
-          <a:off x="145340" y="1358168"/>
-          <a:ext cx="7015748" cy="9697720"/>
+          <a:off x="612267" y="1358168"/>
+          <a:ext cx="8832405" cy="9728200"/>
         </p:xfrm>
         <a:graphic>
           <a:graphicData uri="http://schemas.openxmlformats.org/drawingml/2006/table">
@@ -3445,8 +3445,8 @@
                 <a:tableStyleId>{5940675A-B579-460E-94D1-54222C63F5DA}</a:tableStyleId>
               </a:tblPr>
               <a:tblGrid>
-                <a:gridCol w="5310238"/>
-                <a:gridCol w="1705510"/>
+                <a:gridCol w="5108832"/>
+                <a:gridCol w="3723573"/>
               </a:tblGrid>
               <a:tr h="370840">
                 <a:tc>
@@ -3467,10 +3467,6 @@
                         <a:rPr lang="en-US" sz="1600" b="1" baseline="0" dirty="0" err="1" smtClean="0"/>
                         <a:t>chelatases</a:t>
                       </a:r>
-                      <a:r>
-                        <a:rPr lang="en-US" sz="1600" b="1" baseline="0" dirty="0" smtClean="0"/>
-                        <a:t> from different gene sets</a:t>
-                      </a:r>
                       <a:endParaRPr lang="en-US" sz="1600" b="1" dirty="0"/>
                     </a:p>
                   </a:txBody>
@@ -3483,8 +3479,24 @@
                     <a:p>
                       <a:pPr algn="ctr"/>
                       <a:r>
-                        <a:rPr lang="en-US" sz="1600" b="1" smtClean="0"/>
-                        <a:t>Main taxa</a:t>
+                        <a:rPr lang="en-US" sz="1600" b="1" dirty="0" smtClean="0"/>
+                        <a:t>Genotype(s)</a:t>
+                      </a:r>
+                      <a:r>
+                        <a:rPr lang="en-US" sz="1600" b="1" baseline="0" dirty="0" smtClean="0"/>
+                        <a:t> [</a:t>
+                      </a:r>
+                      <a:r>
+                        <a:rPr lang="en-US" sz="1600" b="1" i="1" baseline="0" dirty="0" smtClean="0"/>
+                        <a:t>m</a:t>
+                      </a:r>
+                      <a:r>
+                        <a:rPr lang="en-US" sz="1600" b="1" i="1" dirty="0" smtClean="0"/>
+                        <a:t>ain taxa</a:t>
+                      </a:r>
+                      <a:r>
+                        <a:rPr lang="en-US" sz="1600" b="1" dirty="0" smtClean="0"/>
+                        <a:t>] (reference)</a:t>
                       </a:r>
                       <a:endParaRPr lang="en-US" sz="1600" b="1" dirty="0"/>
                     </a:p>
@@ -3523,11 +3535,97 @@
                     <a:bodyPr/>
                     <a:lstStyle/>
                     <a:p>
+                      <a:pPr marL="0" marR="0" indent="0" algn="l" defTabSz="2971056" rtl="0" eaLnBrk="1" fontAlgn="auto" latinLnBrk="0" hangingPunct="1">
+                        <a:lnSpc>
+                          <a:spcPct val="100000"/>
+                        </a:lnSpc>
+                        <a:spcBef>
+                          <a:spcPts val="0"/>
+                        </a:spcBef>
+                        <a:spcAft>
+                          <a:spcPts val="0"/>
+                        </a:spcAft>
+                        <a:buClrTx/>
+                        <a:buSzTx/>
+                        <a:buFontTx/>
+                        <a:buNone/>
+                        <a:tabLst/>
+                        <a:defRPr/>
+                      </a:pPr>
                       <a:r>
-                        <a:rPr lang="en-US" sz="1600" dirty="0" err="1" smtClean="0"/>
+                        <a:rPr lang="en-US" sz="1400" b="1" dirty="0" smtClean="0"/>
+                        <a:t>1xchlH, 1xchlD, 1xchlI</a:t>
+                      </a:r>
+                    </a:p>
+                    <a:p>
+                      <a:pPr marL="0" marR="0" indent="0" algn="l" defTabSz="2971056" rtl="0" eaLnBrk="1" fontAlgn="auto" latinLnBrk="0" hangingPunct="1">
+                        <a:lnSpc>
+                          <a:spcPct val="100000"/>
+                        </a:lnSpc>
+                        <a:spcBef>
+                          <a:spcPts val="0"/>
+                        </a:spcBef>
+                        <a:spcAft>
+                          <a:spcPts val="0"/>
+                        </a:spcAft>
+                        <a:buClrTx/>
+                        <a:buSzTx/>
+                        <a:buFontTx/>
+                        <a:buNone/>
+                        <a:tabLst/>
+                        <a:defRPr/>
+                      </a:pPr>
+                      <a:endParaRPr lang="en-US" sz="1400" dirty="0" smtClean="0"/>
+                    </a:p>
+                    <a:p>
+                      <a:r>
+                        <a:rPr lang="en-US" sz="1400" i="1" dirty="0" err="1" smtClean="0"/>
                         <a:t>Proteobacteria</a:t>
                       </a:r>
-                      <a:endParaRPr lang="en-US" sz="1600" dirty="0"/>
+                      <a:endParaRPr lang="en-US" sz="1400" dirty="0" smtClean="0"/>
+                    </a:p>
+                    <a:p>
+                      <a:endParaRPr lang="en-US" sz="1400" dirty="0" smtClean="0"/>
+                    </a:p>
+                    <a:p>
+                      <a:pPr marL="0" marR="0" indent="0" algn="l" defTabSz="2971056" rtl="0" eaLnBrk="1" fontAlgn="auto" latinLnBrk="0" hangingPunct="1">
+                        <a:lnSpc>
+                          <a:spcPct val="100000"/>
+                        </a:lnSpc>
+                        <a:spcBef>
+                          <a:spcPts val="0"/>
+                        </a:spcBef>
+                        <a:spcAft>
+                          <a:spcPts val="0"/>
+                        </a:spcAft>
+                        <a:buClrTx/>
+                        <a:buSzTx/>
+                        <a:buFontTx/>
+                        <a:buNone/>
+                        <a:tabLst/>
+                        <a:defRPr/>
+                      </a:pPr>
+                      <a:r>
+                        <a:rPr lang="en-US" sz="1400" dirty="0" smtClean="0"/>
+                        <a:t>Mg-</a:t>
+                      </a:r>
+                      <a:r>
+                        <a:rPr lang="en-US" sz="1400" dirty="0" err="1" smtClean="0"/>
+                        <a:t>chelatase</a:t>
+                      </a:r>
+                      <a:r>
+                        <a:rPr lang="en-US" sz="1400" dirty="0" smtClean="0"/>
+                        <a:t>: (</a:t>
+                      </a:r>
+                      <a:r>
+                        <a:rPr lang="nb-NO" sz="1400" dirty="0" smtClean="0"/>
+                        <a:t>Gibson et al. 1995</a:t>
+                      </a:r>
+                      <a:r>
+                        <a:rPr lang="en-US" sz="1400" dirty="0" smtClean="0"/>
+                        <a:t>)</a:t>
+                      </a:r>
+                      <a:endParaRPr lang="en-US" sz="1400" dirty="0"/>
                     </a:p>
                   </a:txBody>
                   <a:tcPr/>
@@ -3565,10 +3663,83 @@
                     <a:lstStyle/>
                     <a:p>
                       <a:r>
-                        <a:rPr lang="en-US" sz="1600" dirty="0" err="1" smtClean="0"/>
+                        <a:rPr lang="en-US" sz="1400" b="1" dirty="0" smtClean="0"/>
+                        <a:t>1xcobN, 1xcobT, 1xcobS, 1xchlH, 1xchlD, 1xchlI</a:t>
+                      </a:r>
+                    </a:p>
+                    <a:p>
+                      <a:endParaRPr lang="en-US" sz="1400" dirty="0" smtClean="0"/>
+                    </a:p>
+                    <a:p>
+                      <a:r>
+                        <a:rPr lang="en-US" sz="1400" i="1" dirty="0" err="1" smtClean="0"/>
                         <a:t>Proteobacteria</a:t>
                       </a:r>
-                      <a:endParaRPr lang="en-US" sz="1600" dirty="0"/>
+                      <a:endParaRPr lang="en-US" sz="1400" dirty="0" smtClean="0"/>
+                    </a:p>
+                    <a:p>
+                      <a:endParaRPr lang="en-US" sz="1400" dirty="0" smtClean="0"/>
+                    </a:p>
+                    <a:p>
+                      <a:r>
+                        <a:rPr lang="en-US" sz="1400" dirty="0" smtClean="0"/>
+                        <a:t>Mg-</a:t>
+                      </a:r>
+                      <a:r>
+                        <a:rPr lang="en-US" sz="1400" dirty="0" err="1" smtClean="0"/>
+                        <a:t>chelatase</a:t>
+                      </a:r>
+                      <a:r>
+                        <a:rPr lang="en-US" sz="1400" dirty="0" smtClean="0"/>
+                        <a:t>: (</a:t>
+                      </a:r>
+                      <a:r>
+                        <a:rPr lang="nb-NO" sz="1400" dirty="0" smtClean="0"/>
+                        <a:t>Gibson et al. 1995</a:t>
+                      </a:r>
+                      <a:r>
+                        <a:rPr lang="en-US" sz="1400" dirty="0" smtClean="0"/>
+                        <a:t>)</a:t>
+                      </a:r>
+                    </a:p>
+                    <a:p>
+                      <a:r>
+                        <a:rPr lang="en-US" sz="1400" dirty="0" smtClean="0"/>
+                        <a:t>Co-</a:t>
+                      </a:r>
+                      <a:r>
+                        <a:rPr lang="en-US" sz="1400" dirty="0" err="1" smtClean="0"/>
+                        <a:t>chelatase</a:t>
+                      </a:r>
+                      <a:r>
+                        <a:rPr lang="en-US" sz="1400" dirty="0" smtClean="0"/>
+                        <a:t>:</a:t>
+                      </a:r>
+                      <a:r>
+                        <a:rPr lang="en-US" sz="1400" baseline="0" dirty="0" smtClean="0"/>
+                        <a:t> </a:t>
+                      </a:r>
+                      <a:r>
+                        <a:rPr lang="en-US" sz="1400" dirty="0" smtClean="0"/>
+                        <a:t>(</a:t>
+                      </a:r>
+                      <a:r>
+                        <a:rPr lang="en-US" sz="1400" dirty="0" err="1" smtClean="0"/>
+                        <a:t>Debussche</a:t>
+                      </a:r>
+                      <a:r>
+                        <a:rPr lang="en-US" sz="1400" dirty="0" smtClean="0"/>
+                        <a:t> et al.</a:t>
+                      </a:r>
+                      <a:r>
+                        <a:rPr lang="en-US" sz="1400" baseline="0" dirty="0" smtClean="0"/>
+                        <a:t> </a:t>
+                      </a:r>
+                      <a:r>
+                        <a:rPr lang="en-US" sz="1400" dirty="0" smtClean="0"/>
+                        <a:t>1992)</a:t>
+                      </a:r>
+                      <a:endParaRPr lang="en-US" sz="1400" dirty="0"/>
                     </a:p>
                   </a:txBody>
                   <a:tcPr/>
@@ -3606,10 +3777,223 @@
                     <a:lstStyle/>
                     <a:p>
                       <a:r>
-                        <a:rPr lang="en-US" sz="1600" dirty="0" smtClean="0"/>
+                        <a:rPr lang="en-US" sz="1400" b="1" dirty="0" smtClean="0"/>
+                        <a:t>1xcobN, 1xchlH, 1xchlD, 1xchlI</a:t>
+                      </a:r>
+                    </a:p>
+                    <a:p>
+                      <a:pPr marL="0" marR="0" indent="0" algn="l" defTabSz="2971056" rtl="0" eaLnBrk="1" fontAlgn="auto" latinLnBrk="0" hangingPunct="1">
+                        <a:lnSpc>
+                          <a:spcPct val="100000"/>
+                        </a:lnSpc>
+                        <a:spcBef>
+                          <a:spcPts val="0"/>
+                        </a:spcBef>
+                        <a:spcAft>
+                          <a:spcPts val="0"/>
+                        </a:spcAft>
+                        <a:buClrTx/>
+                        <a:buSzTx/>
+                        <a:buFontTx/>
+                        <a:buNone/>
+                        <a:tabLst/>
+                        <a:defRPr/>
+                      </a:pPr>
+                      <a:r>
+                        <a:rPr lang="en-US" sz="1400" b="1" dirty="0" smtClean="0"/>
+                        <a:t>1xcobN, 2xchlH, 1xchlD, 1xchlI</a:t>
+                      </a:r>
+                    </a:p>
+                    <a:p>
+                      <a:endParaRPr lang="en-US" sz="1400" dirty="0" smtClean="0"/>
+                    </a:p>
+                    <a:p>
+                      <a:r>
+                        <a:rPr lang="en-US" sz="1400" i="1" dirty="0" smtClean="0"/>
                         <a:t>Cyanobacteria</a:t>
                       </a:r>
+                      <a:endParaRPr lang="en-US" sz="1400" dirty="0" smtClean="0"/>
+                    </a:p>
+                    <a:p>
+                      <a:endParaRPr lang="en-US" sz="1400" dirty="0" smtClean="0"/>
+                    </a:p>
+                    <a:p>
+                      <a:r>
+                        <a:rPr lang="en-US" sz="1400" dirty="0" smtClean="0"/>
+                        <a:t>Mg-</a:t>
+                      </a:r>
+                      <a:r>
+                        <a:rPr lang="en-US" sz="1400" dirty="0" err="1" smtClean="0"/>
+                        <a:t>chelatase</a:t>
+                      </a:r>
+                      <a:r>
+                        <a:rPr lang="en-US" sz="1400" dirty="0" smtClean="0"/>
+                        <a:t>: (</a:t>
+                      </a:r>
+                      <a:r>
+                        <a:rPr lang="nb-NO" sz="1400" dirty="0" smtClean="0"/>
+                        <a:t>Gibson et al. 1995</a:t>
+                      </a:r>
+                      <a:r>
+                        <a:rPr lang="en-US" sz="1400" dirty="0" smtClean="0"/>
+                        <a:t>)</a:t>
+                      </a:r>
+                    </a:p>
+                    <a:p>
+                      <a:r>
+                        <a:rPr lang="en-US" sz="1400" dirty="0" smtClean="0"/>
+                        <a:t>Co-</a:t>
+                      </a:r>
+                      <a:r>
+                        <a:rPr lang="en-US" sz="1400" dirty="0" err="1" smtClean="0"/>
+                        <a:t>chelatase</a:t>
+                      </a:r>
+                      <a:r>
+                        <a:rPr lang="en-US" sz="1400" dirty="0" smtClean="0"/>
+                        <a:t>:</a:t>
+                      </a:r>
+                      <a:r>
+                        <a:rPr lang="en-US" sz="1400" baseline="0" dirty="0" smtClean="0"/>
+                        <a:t> </a:t>
+                      </a:r>
+                      <a:r>
+                        <a:rPr lang="en-US" sz="1400" dirty="0" smtClean="0"/>
+                        <a:t>(</a:t>
+                      </a:r>
+                      <a:r>
+                        <a:rPr lang="en-US" sz="1400" dirty="0" err="1" smtClean="0"/>
+                        <a:t>Rodionov</a:t>
+                      </a:r>
+                      <a:r>
+                        <a:rPr lang="en-US" sz="1400" baseline="0" dirty="0" smtClean="0"/>
+                        <a:t> et al. </a:t>
+                      </a:r>
+                      <a:r>
+                        <a:rPr lang="en-US" sz="1400" dirty="0" smtClean="0"/>
+                        <a:t>2003)</a:t>
+                      </a:r>
+                      <a:endParaRPr lang="en-US" sz="1400" dirty="0"/>
+                    </a:p>
+                  </a:txBody>
+                  <a:tcPr/>
+                </a:tc>
+              </a:tr>
+              <a:tr h="370840">
+                <a:tc>
+                  <a:txBody>
+                    <a:bodyPr/>
+                    <a:lstStyle/>
+                    <a:p>
+                      <a:endParaRPr lang="en-US" sz="1600" dirty="0" smtClean="0"/>
+                    </a:p>
+                    <a:p>
+                      <a:endParaRPr lang="en-US" sz="1600" dirty="0" smtClean="0"/>
+                    </a:p>
+                    <a:p>
+                      <a:endParaRPr lang="en-US" sz="1600" dirty="0" smtClean="0"/>
+                    </a:p>
+                    <a:p>
+                      <a:endParaRPr lang="en-US" sz="1600" dirty="0" smtClean="0"/>
+                    </a:p>
+                    <a:p>
+                      <a:endParaRPr lang="en-US" sz="1600" dirty="0" smtClean="0"/>
+                    </a:p>
+                    <a:p>
                       <a:endParaRPr lang="en-US" sz="1600" dirty="0"/>
+                    </a:p>
+                  </a:txBody>
+                  <a:tcPr/>
+                </a:tc>
+                <a:tc>
+                  <a:txBody>
+                    <a:bodyPr/>
+                    <a:lstStyle/>
+                    <a:p>
+                      <a:pPr marL="0" marR="0" indent="0" algn="l" defTabSz="2971056" rtl="0" eaLnBrk="1" fontAlgn="auto" latinLnBrk="0" hangingPunct="1">
+                        <a:lnSpc>
+                          <a:spcPct val="100000"/>
+                        </a:lnSpc>
+                        <a:spcBef>
+                          <a:spcPts val="0"/>
+                        </a:spcBef>
+                        <a:spcAft>
+                          <a:spcPts val="0"/>
+                        </a:spcAft>
+                        <a:buClrTx/>
+                        <a:buSzTx/>
+                        <a:buFontTx/>
+                        <a:buNone/>
+                        <a:tabLst/>
+                        <a:defRPr/>
+                      </a:pPr>
+                      <a:r>
+                        <a:rPr lang="en-US" sz="1400" b="1" dirty="0" smtClean="0"/>
+                        <a:t>1xcobN, 1xchlD, 1xchlI</a:t>
+                      </a:r>
+                    </a:p>
+                    <a:p>
+                      <a:endParaRPr lang="en-US" sz="1400" dirty="0" smtClean="0"/>
+                    </a:p>
+                    <a:p>
+                      <a:r>
+                        <a:rPr lang="en-US" sz="1400" i="1" dirty="0" err="1" smtClean="0"/>
+                        <a:t>Actinobacteria</a:t>
+                      </a:r>
+                      <a:endParaRPr lang="en-US" sz="1400" dirty="0" smtClean="0"/>
+                    </a:p>
+                    <a:p>
+                      <a:endParaRPr lang="en-US" sz="1400" dirty="0" smtClean="0"/>
+                    </a:p>
+                    <a:p>
+                      <a:pPr marL="0" marR="0" indent="0" algn="l" defTabSz="2971056" rtl="0" eaLnBrk="1" fontAlgn="auto" latinLnBrk="0" hangingPunct="1">
+                        <a:lnSpc>
+                          <a:spcPct val="100000"/>
+                        </a:lnSpc>
+                        <a:spcBef>
+                          <a:spcPts val="0"/>
+                        </a:spcBef>
+                        <a:spcAft>
+                          <a:spcPts val="0"/>
+                        </a:spcAft>
+                        <a:buClrTx/>
+                        <a:buSzTx/>
+                        <a:buFontTx/>
+                        <a:buNone/>
+                        <a:tabLst/>
+                        <a:defRPr/>
+                      </a:pPr>
+                      <a:r>
+                        <a:rPr lang="en-US" sz="1400" dirty="0" smtClean="0"/>
+                        <a:t>Co-</a:t>
+                      </a:r>
+                      <a:r>
+                        <a:rPr lang="en-US" sz="1400" dirty="0" err="1" smtClean="0"/>
+                        <a:t>chelatase</a:t>
+                      </a:r>
+                      <a:r>
+                        <a:rPr lang="en-US" sz="1400" dirty="0" smtClean="0"/>
+                        <a:t>:</a:t>
+                      </a:r>
+                      <a:r>
+                        <a:rPr lang="en-US" sz="1400" baseline="0" dirty="0" smtClean="0"/>
+                        <a:t> </a:t>
+                      </a:r>
+                      <a:r>
+                        <a:rPr lang="en-US" sz="1400" dirty="0" smtClean="0"/>
+                        <a:t>(</a:t>
+                      </a:r>
+                      <a:r>
+                        <a:rPr lang="en-US" sz="1400" dirty="0" err="1" smtClean="0"/>
+                        <a:t>Rodionov</a:t>
+                      </a:r>
+                      <a:r>
+                        <a:rPr lang="en-US" sz="1400" baseline="0" dirty="0" smtClean="0"/>
+                        <a:t> et al. </a:t>
+                      </a:r>
+                      <a:r>
+                        <a:rPr lang="en-US" sz="1400" dirty="0" smtClean="0"/>
+                        <a:t>2003)</a:t>
+                      </a:r>
                     </a:p>
                   </a:txBody>
                   <a:tcPr/>
@@ -3647,10 +4031,53 @@
                     <a:lstStyle/>
                     <a:p>
                       <a:r>
-                        <a:rPr lang="en-US" sz="1600" dirty="0" err="1" smtClean="0"/>
+                        <a:rPr lang="en-US" sz="1400" b="1" dirty="0" smtClean="0"/>
+                        <a:t>1xcobN, 1xfs-chlD</a:t>
+                      </a:r>
+                    </a:p>
+                    <a:p>
+                      <a:endParaRPr lang="en-US" sz="1400" dirty="0" smtClean="0"/>
+                    </a:p>
+                    <a:p>
+                      <a:r>
+                        <a:rPr lang="en-US" sz="1400" i="1" dirty="0" err="1" smtClean="0"/>
+                        <a:t>Proteobacteria</a:t>
+                      </a:r>
+                      <a:r>
+                        <a:rPr lang="en-US" sz="1400" i="1" dirty="0" smtClean="0"/>
+                        <a:t>, </a:t>
+                      </a:r>
+                      <a:r>
+                        <a:rPr lang="en-US" sz="1400" i="1" dirty="0" err="1" smtClean="0"/>
                         <a:t>Actinobacteria</a:t>
                       </a:r>
-                      <a:endParaRPr lang="en-US" sz="1600" dirty="0"/>
+                      <a:r>
+                        <a:rPr lang="en-US" sz="1400" i="1" dirty="0" smtClean="0"/>
+                        <a:t>, Archaea</a:t>
+                      </a:r>
+                      <a:endParaRPr lang="en-US" sz="1400" dirty="0" smtClean="0"/>
+                    </a:p>
+                    <a:p>
+                      <a:endParaRPr lang="en-US" sz="1400" dirty="0" smtClean="0"/>
+                    </a:p>
+                    <a:p>
+                      <a:r>
+                        <a:rPr lang="en-US" sz="1400" dirty="0" smtClean="0"/>
+                        <a:t>Co-</a:t>
+                      </a:r>
+                      <a:r>
+                        <a:rPr lang="en-US" sz="1400" dirty="0" err="1" smtClean="0"/>
+                        <a:t>chelatase</a:t>
+                      </a:r>
+                      <a:r>
+                        <a:rPr lang="en-US" sz="1400" dirty="0" smtClean="0"/>
+                        <a:t>:</a:t>
+                      </a:r>
+                      <a:r>
+                        <a:rPr lang="en-US" sz="1400" baseline="0" dirty="0" smtClean="0"/>
+                        <a:t> (this study)</a:t>
+                      </a:r>
+                      <a:endParaRPr lang="en-US" sz="1400" dirty="0"/>
                     </a:p>
                   </a:txBody>
                   <a:tcPr/>
@@ -3687,80 +4114,85 @@
                     <a:bodyPr/>
                     <a:lstStyle/>
                     <a:p>
+                      <a:pPr marL="0" marR="0" indent="0" algn="l" defTabSz="2971056" rtl="0" eaLnBrk="1" fontAlgn="auto" latinLnBrk="0" hangingPunct="1">
+                        <a:lnSpc>
+                          <a:spcPct val="100000"/>
+                        </a:lnSpc>
+                        <a:spcBef>
+                          <a:spcPts val="0"/>
+                        </a:spcBef>
+                        <a:spcAft>
+                          <a:spcPts val="0"/>
+                        </a:spcAft>
+                        <a:buClrTx/>
+                        <a:buSzTx/>
+                        <a:buFontTx/>
+                        <a:buNone/>
+                        <a:tabLst/>
+                        <a:defRPr/>
+                      </a:pPr>
                       <a:r>
-                        <a:rPr lang="en-US" sz="1600" dirty="0" err="1" smtClean="0"/>
-                        <a:t>Proteobacteria</a:t>
+                        <a:rPr lang="en-US" sz="1400" b="1" smtClean="0"/>
+                        <a:t>1xcobN, 1xchlD</a:t>
                       </a:r>
-                      <a:endParaRPr lang="en-US" sz="1600" dirty="0" smtClean="0"/>
                     </a:p>
                     <a:p>
-                      <a:r>
-                        <a:rPr lang="en-US" sz="1600" dirty="0" err="1" smtClean="0"/>
-                        <a:t>Actinobacteria</a:t>
-                      </a:r>
-                      <a:endParaRPr lang="en-US" sz="1600" dirty="0" smtClean="0"/>
+                      <a:endParaRPr lang="en-US" sz="1400" smtClean="0"/>
                     </a:p>
                     <a:p>
+                      <a:pPr marL="0" marR="0" indent="0" algn="l" defTabSz="2971056" rtl="0" eaLnBrk="1" fontAlgn="auto" latinLnBrk="0" hangingPunct="1">
+                        <a:lnSpc>
+                          <a:spcPct val="100000"/>
+                        </a:lnSpc>
+                        <a:spcBef>
+                          <a:spcPts val="0"/>
+                        </a:spcBef>
+                        <a:spcAft>
+                          <a:spcPts val="0"/>
+                        </a:spcAft>
+                        <a:buClrTx/>
+                        <a:buSzTx/>
+                        <a:buFontTx/>
+                        <a:buNone/>
+                        <a:tabLst/>
+                        <a:defRPr/>
+                      </a:pPr>
                       <a:r>
-                        <a:rPr lang="en-US" sz="1600" dirty="0" smtClean="0"/>
-                        <a:t>Archaea</a:t>
+                        <a:rPr lang="en-US" sz="1400" i="1" smtClean="0"/>
+                        <a:t>Proteobacteria, Actinobacteria, Archaea</a:t>
                       </a:r>
-                      <a:endParaRPr lang="en-US" sz="1600" dirty="0"/>
-                    </a:p>
-                  </a:txBody>
-                  <a:tcPr/>
-                </a:tc>
-              </a:tr>
-              <a:tr h="370840">
-                <a:tc>
-                  <a:txBody>
-                    <a:bodyPr/>
-                    <a:lstStyle/>
-                    <a:p>
-                      <a:endParaRPr lang="en-US" sz="1600" dirty="0" smtClean="0"/>
+                      <a:endParaRPr lang="en-US" sz="1400" smtClean="0"/>
                     </a:p>
                     <a:p>
-                      <a:endParaRPr lang="en-US" sz="1600" dirty="0" smtClean="0"/>
+                      <a:endParaRPr lang="en-US" sz="1400" smtClean="0"/>
                     </a:p>
                     <a:p>
-                      <a:endParaRPr lang="en-US" sz="1600" dirty="0" smtClean="0"/>
-                    </a:p>
-                    <a:p>
-                      <a:endParaRPr lang="en-US" sz="1600" dirty="0" smtClean="0"/>
-                    </a:p>
-                    <a:p>
-                      <a:endParaRPr lang="en-US" sz="1600" dirty="0" smtClean="0"/>
-                    </a:p>
-                    <a:p>
-                      <a:endParaRPr lang="en-US" sz="1600" dirty="0"/>
-                    </a:p>
-                  </a:txBody>
-                  <a:tcPr/>
-                </a:tc>
-                <a:tc>
-                  <a:txBody>
-                    <a:bodyPr/>
-                    <a:lstStyle/>
-                    <a:p>
+                      <a:pPr marL="0" marR="0" indent="0" algn="l" defTabSz="2971056" rtl="0" eaLnBrk="1" fontAlgn="auto" latinLnBrk="0" hangingPunct="1">
+                        <a:lnSpc>
+                          <a:spcPct val="100000"/>
+                        </a:lnSpc>
+                        <a:spcBef>
+                          <a:spcPts val="0"/>
+                        </a:spcBef>
+                        <a:spcAft>
+                          <a:spcPts val="0"/>
+                        </a:spcAft>
+                        <a:buClrTx/>
+                        <a:buSzTx/>
+                        <a:buFontTx/>
+                        <a:buNone/>
+                        <a:tabLst/>
+                        <a:defRPr/>
+                      </a:pPr>
                       <a:r>
-                        <a:rPr lang="en-US" sz="1600" dirty="0" err="1" smtClean="0"/>
-                        <a:t>Proteobacteria</a:t>
+                        <a:rPr lang="en-US" sz="1400" smtClean="0"/>
+                        <a:t>Co-chelatase:</a:t>
                       </a:r>
-                      <a:endParaRPr lang="en-US" sz="1600" dirty="0" smtClean="0"/>
-                    </a:p>
-                    <a:p>
                       <a:r>
-                        <a:rPr lang="en-US" sz="1600" dirty="0" err="1" smtClean="0"/>
-                        <a:t>Actinobacteria</a:t>
+                        <a:rPr lang="en-US" sz="1400" baseline="0" smtClean="0"/>
+                        <a:t> (this study)</a:t>
                       </a:r>
-                      <a:endParaRPr lang="en-US" sz="1600" dirty="0" smtClean="0"/>
-                    </a:p>
-                    <a:p>
-                      <a:r>
-                        <a:rPr lang="en-US" sz="1600" dirty="0" smtClean="0"/>
-                        <a:t>Archaea</a:t>
-                      </a:r>
-                      <a:endParaRPr lang="en-US" sz="1600" dirty="0"/>
+                      <a:endParaRPr lang="en-US" sz="1400" smtClean="0"/>
                     </a:p>
                   </a:txBody>
                   <a:tcPr/>
@@ -3778,7 +4210,7 @@
         </p:nvGrpSpPr>
         <p:grpSpPr>
           <a:xfrm>
-            <a:off x="4563022" y="3335346"/>
+            <a:off x="5029950" y="3335346"/>
             <a:ext cx="534312" cy="507144"/>
             <a:chOff x="4563022" y="2659785"/>
             <a:chExt cx="534312" cy="507144"/>
@@ -3873,7 +4305,7 @@
         </p:nvGrpSpPr>
         <p:grpSpPr>
           <a:xfrm>
-            <a:off x="3908577" y="3335346"/>
+            <a:off x="4375505" y="3335346"/>
             <a:ext cx="672033" cy="516193"/>
             <a:chOff x="3908577" y="2659785"/>
             <a:chExt cx="672033" cy="516193"/>
@@ -3965,7 +4397,7 @@
         </p:nvGrpSpPr>
         <p:grpSpPr>
           <a:xfrm>
-            <a:off x="2774212" y="3335346"/>
+            <a:off x="3241140" y="3335346"/>
             <a:ext cx="1027331" cy="507144"/>
             <a:chOff x="2923397" y="2739646"/>
             <a:chExt cx="1027331" cy="507144"/>
@@ -4057,7 +4489,7 @@
         </p:nvSpPr>
         <p:spPr>
           <a:xfrm>
-            <a:off x="909034" y="11131230"/>
+            <a:off x="1375962" y="11131230"/>
             <a:ext cx="5880074" cy="338554"/>
           </a:xfrm>
           <a:prstGeom prst="rect">
@@ -4101,7 +4533,7 @@
         </p:nvGrpSpPr>
         <p:grpSpPr>
           <a:xfrm>
-            <a:off x="246728" y="11168813"/>
+            <a:off x="713656" y="11168813"/>
             <a:ext cx="668867" cy="266808"/>
             <a:chOff x="246728" y="135253"/>
             <a:chExt cx="668867" cy="266808"/>
@@ -4109,7 +4541,7 @@
         </p:grpSpPr>
         <p:sp>
           <p:nvSpPr>
-            <p:cNvPr id="415" name="Pentagon 414"/>
+            <p:cNvPr id="414" name="Pentagon 413"/>
             <p:cNvSpPr/>
             <p:nvPr/>
           </p:nvSpPr>
@@ -4156,7 +4588,7 @@
         </p:sp>
         <p:cxnSp>
           <p:nvCxnSpPr>
-            <p:cNvPr id="416" name="Straight Connector 415"/>
+            <p:cNvPr id="415" name="Straight Connector 414"/>
             <p:cNvCxnSpPr/>
             <p:nvPr/>
           </p:nvCxnSpPr>
@@ -4193,13 +4625,13 @@
       </p:grpSp>
       <p:sp>
         <p:nvSpPr>
-          <p:cNvPr id="418" name="Rectangle 417"/>
+          <p:cNvPr id="416" name="Rectangle 415"/>
           <p:cNvSpPr/>
           <p:nvPr/>
         </p:nvSpPr>
         <p:spPr>
           <a:xfrm>
-            <a:off x="909033" y="11544589"/>
+            <a:off x="1375961" y="11544589"/>
             <a:ext cx="5880075" cy="338554"/>
           </a:xfrm>
           <a:prstGeom prst="rect">
@@ -4249,13 +4681,13 @@
       </p:sp>
       <p:grpSp>
         <p:nvGrpSpPr>
-          <p:cNvPr id="419" name="Group 418"/>
+          <p:cNvPr id="417" name="Group 416"/>
           <p:cNvGrpSpPr/>
           <p:nvPr/>
         </p:nvGrpSpPr>
         <p:grpSpPr>
           <a:xfrm>
-            <a:off x="246728" y="11523267"/>
+            <a:off x="713656" y="11523267"/>
             <a:ext cx="668867" cy="325713"/>
             <a:chOff x="246728" y="489707"/>
             <a:chExt cx="668867" cy="325713"/>
@@ -4263,7 +4695,7 @@
         </p:grpSpPr>
         <p:sp>
           <p:nvSpPr>
-            <p:cNvPr id="420" name="Pentagon 419"/>
+            <p:cNvPr id="418" name="Pentagon 417"/>
             <p:cNvSpPr/>
             <p:nvPr/>
           </p:nvSpPr>
@@ -4310,7 +4742,7 @@
         </p:sp>
         <p:cxnSp>
           <p:nvCxnSpPr>
-            <p:cNvPr id="421" name="Straight Connector 420"/>
+            <p:cNvPr id="419" name="Straight Connector 418"/>
             <p:cNvCxnSpPr/>
             <p:nvPr/>
           </p:nvCxnSpPr>
@@ -4346,7 +4778,7 @@
         </p:cxnSp>
         <p:sp>
           <p:nvSpPr>
-            <p:cNvPr id="441" name="Connector 440"/>
+            <p:cNvPr id="420" name="Connector 419"/>
             <p:cNvSpPr/>
             <p:nvPr/>
           </p:nvSpPr>
@@ -4394,13 +4826,13 @@
       </p:grpSp>
       <p:cxnSp>
         <p:nvCxnSpPr>
-          <p:cNvPr id="457" name="Straight Connector 456"/>
+          <p:cNvPr id="421" name="Straight Connector 420"/>
           <p:cNvCxnSpPr/>
           <p:nvPr/>
         </p:nvCxnSpPr>
         <p:spPr>
           <a:xfrm>
-            <a:off x="246728" y="1913217"/>
+            <a:off x="713656" y="1913217"/>
             <a:ext cx="2527484" cy="0"/>
           </a:xfrm>
           <a:prstGeom prst="line">
@@ -4430,13 +4862,13 @@
       </p:cxnSp>
       <p:grpSp>
         <p:nvGrpSpPr>
-          <p:cNvPr id="458" name="Group 457"/>
+          <p:cNvPr id="422" name="Group 421"/>
           <p:cNvGrpSpPr/>
           <p:nvPr/>
         </p:nvGrpSpPr>
         <p:grpSpPr>
           <a:xfrm>
-            <a:off x="1480667" y="1777534"/>
+            <a:off x="1947595" y="1777534"/>
             <a:ext cx="668867" cy="500686"/>
             <a:chOff x="2688039" y="1826468"/>
             <a:chExt cx="668867" cy="500686"/>
@@ -4444,7 +4876,7 @@
         </p:grpSpPr>
         <p:sp>
           <p:nvSpPr>
-            <p:cNvPr id="459" name="Pentagon 458"/>
+            <p:cNvPr id="423" name="Pentagon 422"/>
             <p:cNvSpPr/>
             <p:nvPr/>
           </p:nvSpPr>
@@ -4491,7 +4923,7 @@
         </p:sp>
         <p:sp>
           <p:nvSpPr>
-            <p:cNvPr id="460" name="Rectangle 459"/>
+            <p:cNvPr id="424" name="Rectangle 423"/>
             <p:cNvSpPr/>
             <p:nvPr/>
           </p:nvSpPr>
@@ -4522,13 +4954,13 @@
       </p:grpSp>
       <p:grpSp>
         <p:nvGrpSpPr>
-          <p:cNvPr id="461" name="Group 460"/>
+          <p:cNvPr id="425" name="Group 424"/>
           <p:cNvGrpSpPr/>
           <p:nvPr/>
         </p:nvGrpSpPr>
         <p:grpSpPr>
           <a:xfrm>
-            <a:off x="354191" y="1777534"/>
+            <a:off x="821119" y="1777534"/>
             <a:ext cx="1027331" cy="504276"/>
             <a:chOff x="1134597" y="1826468"/>
             <a:chExt cx="1027331" cy="504276"/>
@@ -4536,7 +4968,7 @@
         </p:grpSpPr>
         <p:sp>
           <p:nvSpPr>
-            <p:cNvPr id="462" name="Pentagon 461"/>
+            <p:cNvPr id="426" name="Pentagon 425"/>
             <p:cNvSpPr/>
             <p:nvPr/>
           </p:nvSpPr>
@@ -4583,7 +5015,7 @@
         </p:sp>
         <p:sp>
           <p:nvSpPr>
-            <p:cNvPr id="463" name="Rectangle 462"/>
+            <p:cNvPr id="427" name="Rectangle 426"/>
             <p:cNvSpPr/>
             <p:nvPr/>
           </p:nvSpPr>
@@ -4614,13 +5046,13 @@
       </p:grpSp>
       <p:grpSp>
         <p:nvGrpSpPr>
-          <p:cNvPr id="464" name="Group 463"/>
+          <p:cNvPr id="428" name="Group 427"/>
           <p:cNvGrpSpPr/>
           <p:nvPr/>
         </p:nvGrpSpPr>
         <p:grpSpPr>
           <a:xfrm>
-            <a:off x="2131129" y="1780423"/>
+            <a:off x="2598057" y="1780423"/>
             <a:ext cx="534312" cy="501961"/>
             <a:chOff x="2911535" y="1829357"/>
             <a:chExt cx="534312" cy="501961"/>
@@ -4628,7 +5060,7 @@
         </p:grpSpPr>
         <p:sp>
           <p:nvSpPr>
-            <p:cNvPr id="465" name="Rectangle 464"/>
+            <p:cNvPr id="429" name="Rectangle 428"/>
             <p:cNvSpPr/>
             <p:nvPr/>
           </p:nvSpPr>
@@ -4658,7 +5090,7 @@
         </p:sp>
         <p:sp>
           <p:nvSpPr>
-            <p:cNvPr id="466" name="Pentagon 465"/>
+            <p:cNvPr id="430" name="Pentagon 429"/>
             <p:cNvSpPr/>
             <p:nvPr/>
           </p:nvSpPr>
@@ -4706,13 +5138,13 @@
       </p:grpSp>
       <p:grpSp>
         <p:nvGrpSpPr>
-          <p:cNvPr id="467" name="Group 466"/>
+          <p:cNvPr id="431" name="Group 430"/>
           <p:cNvGrpSpPr/>
           <p:nvPr/>
         </p:nvGrpSpPr>
         <p:grpSpPr>
           <a:xfrm>
-            <a:off x="1480667" y="3335346"/>
+            <a:off x="1947595" y="3335346"/>
             <a:ext cx="668867" cy="500686"/>
             <a:chOff x="2688039" y="1826468"/>
             <a:chExt cx="668867" cy="500686"/>
@@ -4720,7 +5152,7 @@
         </p:grpSpPr>
         <p:sp>
           <p:nvSpPr>
-            <p:cNvPr id="468" name="Pentagon 467"/>
+            <p:cNvPr id="432" name="Pentagon 431"/>
             <p:cNvSpPr/>
             <p:nvPr/>
           </p:nvSpPr>
@@ -4767,7 +5199,7 @@
         </p:sp>
         <p:sp>
           <p:nvSpPr>
-            <p:cNvPr id="469" name="Rectangle 468"/>
+            <p:cNvPr id="433" name="Rectangle 432"/>
             <p:cNvSpPr/>
             <p:nvPr/>
           </p:nvSpPr>
@@ -4798,13 +5230,13 @@
       </p:grpSp>
       <p:grpSp>
         <p:nvGrpSpPr>
-          <p:cNvPr id="470" name="Group 469"/>
+          <p:cNvPr id="434" name="Group 433"/>
           <p:cNvGrpSpPr/>
           <p:nvPr/>
         </p:nvGrpSpPr>
         <p:grpSpPr>
           <a:xfrm>
-            <a:off x="354191" y="3335346"/>
+            <a:off x="821119" y="3335346"/>
             <a:ext cx="1027331" cy="504276"/>
             <a:chOff x="1134597" y="1826468"/>
             <a:chExt cx="1027331" cy="504276"/>
@@ -4812,7 +5244,7 @@
         </p:grpSpPr>
         <p:sp>
           <p:nvSpPr>
-            <p:cNvPr id="471" name="Pentagon 470"/>
+            <p:cNvPr id="435" name="Pentagon 434"/>
             <p:cNvSpPr/>
             <p:nvPr/>
           </p:nvSpPr>
@@ -4859,7 +5291,7 @@
         </p:sp>
         <p:sp>
           <p:nvSpPr>
-            <p:cNvPr id="472" name="Rectangle 471"/>
+            <p:cNvPr id="436" name="Rectangle 435"/>
             <p:cNvSpPr/>
             <p:nvPr/>
           </p:nvSpPr>
@@ -4890,13 +5322,13 @@
       </p:grpSp>
       <p:grpSp>
         <p:nvGrpSpPr>
-          <p:cNvPr id="473" name="Group 472"/>
+          <p:cNvPr id="437" name="Group 436"/>
           <p:cNvGrpSpPr/>
           <p:nvPr/>
         </p:nvGrpSpPr>
         <p:grpSpPr>
           <a:xfrm>
-            <a:off x="2131129" y="3338235"/>
+            <a:off x="2598057" y="3338235"/>
             <a:ext cx="534312" cy="501961"/>
             <a:chOff x="2911535" y="1829357"/>
             <a:chExt cx="534312" cy="501961"/>
@@ -4904,7 +5336,7 @@
         </p:grpSpPr>
         <p:sp>
           <p:nvSpPr>
-            <p:cNvPr id="474" name="Rectangle 473"/>
+            <p:cNvPr id="438" name="Rectangle 437"/>
             <p:cNvSpPr/>
             <p:nvPr/>
           </p:nvSpPr>
@@ -4934,7 +5366,7 @@
         </p:sp>
         <p:sp>
           <p:nvSpPr>
-            <p:cNvPr id="475" name="Pentagon 474"/>
+            <p:cNvPr id="439" name="Pentagon 438"/>
             <p:cNvSpPr/>
             <p:nvPr/>
           </p:nvSpPr>
@@ -4982,13 +5414,13 @@
       </p:grpSp>
       <p:cxnSp>
         <p:nvCxnSpPr>
-          <p:cNvPr id="476" name="Straight Connector 475"/>
+          <p:cNvPr id="440" name="Straight Connector 439"/>
           <p:cNvCxnSpPr/>
           <p:nvPr/>
         </p:nvCxnSpPr>
         <p:spPr>
           <a:xfrm>
-            <a:off x="589794" y="606306"/>
+            <a:off x="1056722" y="606306"/>
             <a:ext cx="1061697" cy="192173"/>
           </a:xfrm>
           <a:prstGeom prst="line">
@@ -5017,13 +5449,13 @@
       </p:cxnSp>
       <p:sp>
         <p:nvSpPr>
-          <p:cNvPr id="477" name="Rectangle 476"/>
+          <p:cNvPr id="441" name="Rectangle 440"/>
           <p:cNvSpPr/>
           <p:nvPr/>
         </p:nvSpPr>
         <p:spPr>
           <a:xfrm>
-            <a:off x="27014" y="421194"/>
+            <a:off x="493942" y="421194"/>
             <a:ext cx="617535" cy="338554"/>
           </a:xfrm>
           <a:prstGeom prst="rect">
@@ -5047,13 +5479,13 @@
       </p:sp>
       <p:sp>
         <p:nvSpPr>
-          <p:cNvPr id="478" name="Rectangle 477"/>
+          <p:cNvPr id="442" name="Rectangle 441"/>
           <p:cNvSpPr/>
           <p:nvPr/>
         </p:nvSpPr>
         <p:spPr>
           <a:xfrm>
-            <a:off x="638738" y="952566"/>
+            <a:off x="1105666" y="952566"/>
             <a:ext cx="2480422" cy="338554"/>
           </a:xfrm>
           <a:prstGeom prst="rect">
@@ -5089,13 +5521,13 @@
       </p:sp>
       <p:sp>
         <p:nvSpPr>
-          <p:cNvPr id="479" name="Rectangle 478"/>
+          <p:cNvPr id="443" name="Rectangle 442"/>
           <p:cNvSpPr/>
           <p:nvPr/>
         </p:nvSpPr>
         <p:spPr>
           <a:xfrm>
-            <a:off x="257637" y="32294"/>
+            <a:off x="724565" y="32294"/>
             <a:ext cx="617535" cy="338554"/>
           </a:xfrm>
           <a:prstGeom prst="rect">
@@ -5119,13 +5551,13 @@
       </p:sp>
       <p:cxnSp>
         <p:nvCxnSpPr>
-          <p:cNvPr id="480" name="Straight Connector 479"/>
+          <p:cNvPr id="444" name="Straight Connector 443"/>
           <p:cNvCxnSpPr/>
           <p:nvPr/>
         </p:nvCxnSpPr>
         <p:spPr>
           <a:xfrm>
-            <a:off x="811729" y="228996"/>
+            <a:off x="1278657" y="228996"/>
             <a:ext cx="547756" cy="216275"/>
           </a:xfrm>
           <a:prstGeom prst="line">
@@ -5154,13 +5586,13 @@
       </p:cxnSp>
       <p:sp>
         <p:nvSpPr>
-          <p:cNvPr id="481" name="Rectangle 480"/>
+          <p:cNvPr id="445" name="Rectangle 444"/>
           <p:cNvSpPr/>
           <p:nvPr/>
         </p:nvSpPr>
         <p:spPr>
           <a:xfrm>
-            <a:off x="1845323" y="-74641"/>
+            <a:off x="2312251" y="-74641"/>
             <a:ext cx="617535" cy="338554"/>
           </a:xfrm>
           <a:prstGeom prst="rect">
@@ -5184,13 +5616,13 @@
       </p:sp>
       <p:cxnSp>
         <p:nvCxnSpPr>
-          <p:cNvPr id="482" name="Straight Connector 481"/>
+          <p:cNvPr id="446" name="Straight Connector 445"/>
           <p:cNvCxnSpPr/>
           <p:nvPr/>
         </p:nvCxnSpPr>
         <p:spPr>
           <a:xfrm>
-            <a:off x="2142591" y="216874"/>
+            <a:off x="2609519" y="216874"/>
             <a:ext cx="26115" cy="333824"/>
           </a:xfrm>
           <a:prstGeom prst="line">
@@ -5219,13 +5651,13 @@
       </p:cxnSp>
       <p:sp>
         <p:nvSpPr>
-          <p:cNvPr id="483" name="Rectangle 482"/>
+          <p:cNvPr id="447" name="Rectangle 446"/>
           <p:cNvSpPr/>
           <p:nvPr/>
         </p:nvSpPr>
         <p:spPr>
           <a:xfrm>
-            <a:off x="4117632" y="425201"/>
+            <a:off x="4584560" y="425201"/>
             <a:ext cx="654544" cy="338554"/>
           </a:xfrm>
           <a:prstGeom prst="rect">
@@ -5249,13 +5681,13 @@
       </p:sp>
       <p:cxnSp>
         <p:nvCxnSpPr>
-          <p:cNvPr id="484" name="Straight Connector 483"/>
+          <p:cNvPr id="448" name="Straight Connector 447"/>
           <p:cNvCxnSpPr/>
           <p:nvPr/>
         </p:nvCxnSpPr>
         <p:spPr>
           <a:xfrm flipH="1" flipV="1">
-            <a:off x="4772176" y="638990"/>
+            <a:off x="5239104" y="638990"/>
             <a:ext cx="1190509" cy="119457"/>
           </a:xfrm>
           <a:prstGeom prst="line">
@@ -5284,13 +5716,13 @@
       </p:cxnSp>
       <p:sp>
         <p:nvSpPr>
-          <p:cNvPr id="485" name="Rectangle 484"/>
+          <p:cNvPr id="449" name="Rectangle 448"/>
           <p:cNvSpPr/>
           <p:nvPr/>
         </p:nvSpPr>
         <p:spPr>
           <a:xfrm>
-            <a:off x="4665131" y="952566"/>
+            <a:off x="5132059" y="952566"/>
             <a:ext cx="2480422" cy="338554"/>
           </a:xfrm>
           <a:prstGeom prst="rect">
@@ -5326,13 +5758,13 @@
       </p:sp>
       <p:sp>
         <p:nvSpPr>
-          <p:cNvPr id="486" name="Rectangle 485"/>
+          <p:cNvPr id="450" name="Rectangle 449"/>
           <p:cNvSpPr/>
           <p:nvPr/>
         </p:nvSpPr>
         <p:spPr>
           <a:xfrm>
-            <a:off x="4432412" y="-36144"/>
+            <a:off x="4899340" y="-36144"/>
             <a:ext cx="654544" cy="338554"/>
           </a:xfrm>
           <a:prstGeom prst="rect">
@@ -5356,13 +5788,13 @@
       </p:sp>
       <p:cxnSp>
         <p:nvCxnSpPr>
-          <p:cNvPr id="487" name="Straight Connector 486"/>
+          <p:cNvPr id="451" name="Straight Connector 450"/>
           <p:cNvCxnSpPr/>
           <p:nvPr/>
         </p:nvCxnSpPr>
         <p:spPr>
           <a:xfrm>
-            <a:off x="4998389" y="151135"/>
+            <a:off x="5465317" y="151135"/>
             <a:ext cx="682037" cy="270059"/>
           </a:xfrm>
           <a:prstGeom prst="line">
@@ -5391,13 +5823,13 @@
       </p:cxnSp>
       <p:sp>
         <p:nvSpPr>
-          <p:cNvPr id="488" name="Rectangle 487"/>
+          <p:cNvPr id="452" name="Rectangle 451"/>
           <p:cNvSpPr/>
           <p:nvPr/>
         </p:nvSpPr>
         <p:spPr>
           <a:xfrm>
-            <a:off x="6065816" y="-74641"/>
+            <a:off x="6532744" y="-74641"/>
             <a:ext cx="654544" cy="338554"/>
           </a:xfrm>
           <a:prstGeom prst="rect">
@@ -5421,13 +5853,13 @@
       </p:sp>
       <p:cxnSp>
         <p:nvCxnSpPr>
-          <p:cNvPr id="489" name="Straight Connector 488"/>
+          <p:cNvPr id="453" name="Straight Connector 452"/>
           <p:cNvCxnSpPr/>
           <p:nvPr/>
         </p:nvCxnSpPr>
         <p:spPr>
           <a:xfrm>
-            <a:off x="6461422" y="190834"/>
+            <a:off x="6928350" y="190834"/>
             <a:ext cx="61907" cy="336160"/>
           </a:xfrm>
           <a:prstGeom prst="line">
@@ -5456,7 +5888,7 @@
       </p:cxnSp>
       <p:pic>
         <p:nvPicPr>
-          <p:cNvPr id="490" name="Picture 489"/>
+          <p:cNvPr id="454" name="Picture 453"/>
           <p:cNvPicPr>
             <a:picLocks noChangeAspect="1"/>
           </p:cNvPicPr>
@@ -5476,7 +5908,7 @@
         </p:blipFill>
         <p:spPr>
           <a:xfrm>
-            <a:off x="925530" y="4138918"/>
+            <a:off x="1392458" y="4138918"/>
             <a:ext cx="1605943" cy="681802"/>
           </a:xfrm>
           <a:prstGeom prst="rect">
@@ -5486,13 +5918,13 @@
       </p:pic>
       <p:sp>
         <p:nvSpPr>
-          <p:cNvPr id="491" name="Rectangle 490"/>
+          <p:cNvPr id="455" name="Rectangle 454"/>
           <p:cNvSpPr/>
           <p:nvPr/>
         </p:nvSpPr>
         <p:spPr>
           <a:xfrm>
-            <a:off x="105886" y="4465189"/>
+            <a:off x="572814" y="4465189"/>
             <a:ext cx="1190119" cy="307777"/>
           </a:xfrm>
           <a:prstGeom prst="rect">
@@ -5520,7 +5952,7 @@
       </p:sp>
       <p:pic>
         <p:nvPicPr>
-          <p:cNvPr id="492" name="Picture 491"/>
+          <p:cNvPr id="456" name="Picture 455"/>
           <p:cNvPicPr>
             <a:picLocks noChangeAspect="1"/>
           </p:cNvPicPr>
@@ -5534,7 +5966,7 @@
         </p:blipFill>
         <p:spPr>
           <a:xfrm>
-            <a:off x="1813655" y="4318143"/>
+            <a:off x="2280583" y="4318143"/>
             <a:ext cx="553911" cy="200685"/>
           </a:xfrm>
           <a:prstGeom prst="rect">
@@ -5544,13 +5976,13 @@
       </p:pic>
       <p:grpSp>
         <p:nvGrpSpPr>
-          <p:cNvPr id="493" name="Group 492"/>
+          <p:cNvPr id="457" name="Group 456"/>
           <p:cNvGrpSpPr/>
           <p:nvPr/>
         </p:nvGrpSpPr>
         <p:grpSpPr>
           <a:xfrm>
-            <a:off x="1098419" y="4135252"/>
+            <a:off x="1565347" y="4135252"/>
             <a:ext cx="630082" cy="408046"/>
             <a:chOff x="2285615" y="4644795"/>
             <a:chExt cx="940435" cy="609033"/>
@@ -5558,7 +5990,7 @@
         </p:grpSpPr>
         <p:pic>
           <p:nvPicPr>
-            <p:cNvPr id="494" name="Picture 493" descr="hot-dog-bun.png"/>
+            <p:cNvPr id="458" name="Picture 457" descr="hot-dog-bun.png"/>
             <p:cNvPicPr>
               <a:picLocks noChangeAspect="1"/>
             </p:cNvPicPr>
@@ -5588,7 +6020,7 @@
         </p:pic>
         <p:pic>
           <p:nvPicPr>
-            <p:cNvPr id="495" name="Picture 494"/>
+            <p:cNvPr id="459" name="Picture 458"/>
             <p:cNvPicPr>
               <a:picLocks noChangeAspect="1"/>
             </p:cNvPicPr>
@@ -5613,13 +6045,13 @@
       </p:grpSp>
       <p:cxnSp>
         <p:nvCxnSpPr>
-          <p:cNvPr id="496" name="Straight Connector 495"/>
+          <p:cNvPr id="460" name="Straight Connector 459"/>
           <p:cNvCxnSpPr/>
           <p:nvPr/>
         </p:nvCxnSpPr>
         <p:spPr>
           <a:xfrm>
-            <a:off x="844400" y="3820337"/>
+            <a:off x="1311328" y="3820337"/>
             <a:ext cx="145249" cy="555618"/>
           </a:xfrm>
           <a:prstGeom prst="line">
@@ -5649,13 +6081,13 @@
       </p:cxnSp>
       <p:cxnSp>
         <p:nvCxnSpPr>
-          <p:cNvPr id="497" name="Straight Connector 496"/>
+          <p:cNvPr id="461" name="Straight Connector 460"/>
           <p:cNvCxnSpPr/>
           <p:nvPr/>
         </p:nvCxnSpPr>
         <p:spPr>
           <a:xfrm>
-            <a:off x="1218318" y="8175678"/>
+            <a:off x="1685246" y="8211963"/>
             <a:ext cx="774121" cy="233819"/>
           </a:xfrm>
           <a:prstGeom prst="line">
@@ -5685,13 +6117,13 @@
       </p:cxnSp>
       <p:cxnSp>
         <p:nvCxnSpPr>
-          <p:cNvPr id="498" name="Straight Connector 497"/>
+          <p:cNvPr id="462" name="Straight Connector 461"/>
           <p:cNvCxnSpPr/>
           <p:nvPr/>
         </p:nvCxnSpPr>
         <p:spPr>
           <a:xfrm flipH="1">
-            <a:off x="2125947" y="3791227"/>
+            <a:off x="2592875" y="3791227"/>
             <a:ext cx="252083" cy="508384"/>
           </a:xfrm>
           <a:prstGeom prst="line">
@@ -5721,13 +6153,13 @@
       </p:cxnSp>
       <p:cxnSp>
         <p:nvCxnSpPr>
-          <p:cNvPr id="499" name="Straight Connector 498"/>
+          <p:cNvPr id="463" name="Straight Connector 462"/>
           <p:cNvCxnSpPr/>
           <p:nvPr/>
         </p:nvCxnSpPr>
         <p:spPr>
           <a:xfrm flipH="1">
-            <a:off x="1481524" y="3805760"/>
+            <a:off x="1948452" y="3805760"/>
             <a:ext cx="174024" cy="323434"/>
           </a:xfrm>
           <a:prstGeom prst="line">
@@ -5757,13 +6189,13 @@
       </p:cxnSp>
       <p:grpSp>
         <p:nvGrpSpPr>
-          <p:cNvPr id="500" name="Group 499"/>
+          <p:cNvPr id="464" name="Group 463"/>
           <p:cNvGrpSpPr/>
           <p:nvPr/>
         </p:nvGrpSpPr>
         <p:grpSpPr>
           <a:xfrm>
-            <a:off x="3092146" y="4097205"/>
+            <a:off x="3401344" y="4097205"/>
             <a:ext cx="2386133" cy="731881"/>
             <a:chOff x="2792571" y="4822198"/>
             <a:chExt cx="3462329" cy="1061975"/>
@@ -5771,7 +6203,7 @@
         </p:grpSpPr>
         <p:pic>
           <p:nvPicPr>
-            <p:cNvPr id="501" name="Picture 500"/>
+            <p:cNvPr id="465" name="Picture 464"/>
             <p:cNvPicPr>
               <a:picLocks noChangeAspect="1"/>
             </p:cNvPicPr>
@@ -5801,7 +6233,7 @@
         </p:pic>
         <p:sp>
           <p:nvSpPr>
-            <p:cNvPr id="502" name="Rectangle 501"/>
+            <p:cNvPr id="466" name="Rectangle 465"/>
             <p:cNvSpPr/>
             <p:nvPr/>
           </p:nvSpPr>
@@ -5835,7 +6267,7 @@
         </p:sp>
         <p:pic>
           <p:nvPicPr>
-            <p:cNvPr id="503" name="Picture 502"/>
+            <p:cNvPr id="467" name="Picture 466"/>
             <p:cNvPicPr>
               <a:picLocks noChangeAspect="1"/>
             </p:cNvPicPr>
@@ -5865,7 +6297,7 @@
         </p:pic>
         <p:grpSp>
           <p:nvGrpSpPr>
-            <p:cNvPr id="504" name="Group 503"/>
+            <p:cNvPr id="468" name="Group 467"/>
             <p:cNvGrpSpPr/>
             <p:nvPr/>
           </p:nvGrpSpPr>
@@ -5879,7 +6311,7 @@
           </p:grpSpPr>
           <p:pic>
             <p:nvPicPr>
-              <p:cNvPr id="505" name="Picture 504" descr="hot-dog-bun.png"/>
+              <p:cNvPr id="469" name="Picture 468" descr="hot-dog-bun.png"/>
               <p:cNvPicPr>
                 <a:picLocks noChangeAspect="1"/>
               </p:cNvPicPr>
@@ -5909,7 +6341,7 @@
           </p:pic>
           <p:pic>
             <p:nvPicPr>
-              <p:cNvPr id="506" name="Picture 505"/>
+              <p:cNvPr id="470" name="Picture 469"/>
               <p:cNvPicPr>
                 <a:picLocks noChangeAspect="1"/>
               </p:cNvPicPr>
@@ -5941,14 +6373,14 @@
       </p:grpSp>
       <p:cxnSp>
         <p:nvCxnSpPr>
-          <p:cNvPr id="507" name="Straight Connector 506"/>
+          <p:cNvPr id="471" name="Straight Connector 470"/>
           <p:cNvCxnSpPr/>
           <p:nvPr/>
         </p:nvCxnSpPr>
         <p:spPr>
-          <a:xfrm>
-            <a:off x="3208727" y="3851539"/>
-            <a:ext cx="7697" cy="552053"/>
+          <a:xfrm flipH="1">
+            <a:off x="3589053" y="3809391"/>
+            <a:ext cx="88430" cy="586859"/>
           </a:xfrm>
           <a:prstGeom prst="line">
             <a:avLst/>
@@ -5977,13 +6409,13 @@
       </p:cxnSp>
       <p:cxnSp>
         <p:nvCxnSpPr>
-          <p:cNvPr id="508" name="Straight Connector 507"/>
+          <p:cNvPr id="472" name="Straight Connector 471"/>
           <p:cNvCxnSpPr/>
           <p:nvPr/>
         </p:nvCxnSpPr>
         <p:spPr>
           <a:xfrm flipH="1">
-            <a:off x="4497003" y="3851539"/>
+            <a:off x="4963931" y="3851539"/>
             <a:ext cx="215205" cy="442766"/>
           </a:xfrm>
           <a:prstGeom prst="line">
@@ -6013,13 +6445,13 @@
       </p:cxnSp>
       <p:cxnSp>
         <p:nvCxnSpPr>
-          <p:cNvPr id="509" name="Straight Connector 508"/>
+          <p:cNvPr id="473" name="Straight Connector 472"/>
           <p:cNvCxnSpPr/>
           <p:nvPr/>
         </p:nvCxnSpPr>
         <p:spPr>
           <a:xfrm flipH="1">
-            <a:off x="3777224" y="3820337"/>
+            <a:off x="4244152" y="3820337"/>
             <a:ext cx="359889" cy="262714"/>
           </a:xfrm>
           <a:prstGeom prst="line">
@@ -6049,13 +6481,13 @@
       </p:cxnSp>
       <p:grpSp>
         <p:nvGrpSpPr>
-          <p:cNvPr id="510" name="Group 509"/>
+          <p:cNvPr id="474" name="Group 473"/>
           <p:cNvGrpSpPr/>
           <p:nvPr/>
         </p:nvGrpSpPr>
         <p:grpSpPr>
           <a:xfrm>
-            <a:off x="105886" y="2594683"/>
+            <a:off x="572814" y="2594683"/>
             <a:ext cx="2425587" cy="685468"/>
             <a:chOff x="197001" y="3553732"/>
             <a:chExt cx="2425587" cy="685468"/>
@@ -6063,7 +6495,7 @@
         </p:grpSpPr>
         <p:pic>
           <p:nvPicPr>
-            <p:cNvPr id="511" name="Picture 510"/>
+            <p:cNvPr id="475" name="Picture 474"/>
             <p:cNvPicPr>
               <a:picLocks noChangeAspect="1"/>
             </p:cNvPicPr>
@@ -6093,7 +6525,7 @@
         </p:pic>
         <p:sp>
           <p:nvSpPr>
-            <p:cNvPr id="512" name="Rectangle 511"/>
+            <p:cNvPr id="476" name="Rectangle 475"/>
             <p:cNvSpPr/>
             <p:nvPr/>
           </p:nvSpPr>
@@ -6127,7 +6559,7 @@
         </p:sp>
         <p:pic>
           <p:nvPicPr>
-            <p:cNvPr id="513" name="Picture 512"/>
+            <p:cNvPr id="477" name="Picture 476"/>
             <p:cNvPicPr>
               <a:picLocks noChangeAspect="1"/>
             </p:cNvPicPr>
@@ -6151,7 +6583,7 @@
         </p:pic>
         <p:grpSp>
           <p:nvGrpSpPr>
-            <p:cNvPr id="514" name="Group 513"/>
+            <p:cNvPr id="478" name="Group 477"/>
             <p:cNvGrpSpPr/>
             <p:nvPr/>
           </p:nvGrpSpPr>
@@ -6165,7 +6597,7 @@
           </p:grpSpPr>
           <p:pic>
             <p:nvPicPr>
-              <p:cNvPr id="515" name="Picture 514" descr="hot-dog-bun.png"/>
+              <p:cNvPr id="479" name="Picture 478" descr="hot-dog-bun.png"/>
               <p:cNvPicPr>
                 <a:picLocks noChangeAspect="1"/>
               </p:cNvPicPr>
@@ -6195,7 +6627,7 @@
           </p:pic>
           <p:pic>
             <p:nvPicPr>
-              <p:cNvPr id="516" name="Picture 515"/>
+              <p:cNvPr id="480" name="Picture 479"/>
               <p:cNvPicPr>
                 <a:picLocks noChangeAspect="1"/>
               </p:cNvPicPr>
@@ -6221,13 +6653,13 @@
       </p:grpSp>
       <p:cxnSp>
         <p:nvCxnSpPr>
-          <p:cNvPr id="517" name="Straight Connector 516"/>
+          <p:cNvPr id="481" name="Straight Connector 480"/>
           <p:cNvCxnSpPr/>
           <p:nvPr/>
         </p:nvCxnSpPr>
         <p:spPr>
           <a:xfrm>
-            <a:off x="844400" y="2257526"/>
+            <a:off x="1311328" y="2257526"/>
             <a:ext cx="145249" cy="555618"/>
           </a:xfrm>
           <a:prstGeom prst="line">
@@ -6257,13 +6689,13 @@
       </p:cxnSp>
       <p:cxnSp>
         <p:nvCxnSpPr>
-          <p:cNvPr id="518" name="Straight Connector 517"/>
+          <p:cNvPr id="482" name="Straight Connector 481"/>
           <p:cNvCxnSpPr/>
           <p:nvPr/>
         </p:nvCxnSpPr>
         <p:spPr>
           <a:xfrm flipH="1">
-            <a:off x="2125947" y="2228416"/>
+            <a:off x="2592875" y="2228416"/>
             <a:ext cx="252083" cy="508384"/>
           </a:xfrm>
           <a:prstGeom prst="line">
@@ -6293,13 +6725,13 @@
       </p:cxnSp>
       <p:cxnSp>
         <p:nvCxnSpPr>
-          <p:cNvPr id="519" name="Straight Connector 518"/>
+          <p:cNvPr id="483" name="Straight Connector 482"/>
           <p:cNvCxnSpPr/>
           <p:nvPr/>
         </p:nvCxnSpPr>
         <p:spPr>
           <a:xfrm flipH="1">
-            <a:off x="1481524" y="2242949"/>
+            <a:off x="1948452" y="2242949"/>
             <a:ext cx="174024" cy="323434"/>
           </a:xfrm>
           <a:prstGeom prst="line">
@@ -6329,13 +6761,13 @@
       </p:cxnSp>
       <p:cxnSp>
         <p:nvCxnSpPr>
-          <p:cNvPr id="520" name="Straight Connector 519"/>
+          <p:cNvPr id="484" name="Straight Connector 483"/>
           <p:cNvCxnSpPr/>
           <p:nvPr/>
         </p:nvCxnSpPr>
         <p:spPr>
           <a:xfrm>
-            <a:off x="246728" y="6602299"/>
+            <a:off x="713656" y="6602299"/>
             <a:ext cx="4976625" cy="0"/>
           </a:xfrm>
           <a:prstGeom prst="line">
@@ -6365,13 +6797,13 @@
       </p:cxnSp>
       <p:grpSp>
         <p:nvGrpSpPr>
-          <p:cNvPr id="521" name="Group 520"/>
+          <p:cNvPr id="485" name="Group 484"/>
           <p:cNvGrpSpPr/>
           <p:nvPr/>
         </p:nvGrpSpPr>
         <p:grpSpPr>
           <a:xfrm>
-            <a:off x="2774212" y="6466616"/>
+            <a:off x="3241140" y="6466616"/>
             <a:ext cx="1027331" cy="507144"/>
             <a:chOff x="2923397" y="2739646"/>
             <a:chExt cx="1027331" cy="507144"/>
@@ -6379,7 +6811,7 @@
         </p:grpSpPr>
         <p:sp>
           <p:nvSpPr>
-            <p:cNvPr id="522" name="Pentagon 521"/>
+            <p:cNvPr id="486" name="Pentagon 485"/>
             <p:cNvSpPr/>
             <p:nvPr/>
           </p:nvSpPr>
@@ -6426,7 +6858,7 @@
         </p:sp>
         <p:sp>
           <p:nvSpPr>
-            <p:cNvPr id="523" name="Rectangle 522"/>
+            <p:cNvPr id="487" name="Rectangle 486"/>
             <p:cNvSpPr/>
             <p:nvPr/>
           </p:nvSpPr>
@@ -6457,13 +6889,13 @@
       </p:grpSp>
       <p:grpSp>
         <p:nvGrpSpPr>
-          <p:cNvPr id="524" name="Group 523"/>
+          <p:cNvPr id="488" name="Group 487"/>
           <p:cNvGrpSpPr/>
           <p:nvPr/>
         </p:nvGrpSpPr>
         <p:grpSpPr>
           <a:xfrm>
-            <a:off x="1480667" y="6466616"/>
+            <a:off x="1947595" y="6466616"/>
             <a:ext cx="668867" cy="500686"/>
             <a:chOff x="2688039" y="1826468"/>
             <a:chExt cx="668867" cy="500686"/>
@@ -6471,7 +6903,7 @@
         </p:grpSpPr>
         <p:sp>
           <p:nvSpPr>
-            <p:cNvPr id="525" name="Pentagon 524"/>
+            <p:cNvPr id="489" name="Pentagon 488"/>
             <p:cNvSpPr/>
             <p:nvPr/>
           </p:nvSpPr>
@@ -6518,7 +6950,7 @@
         </p:sp>
         <p:sp>
           <p:nvSpPr>
-            <p:cNvPr id="526" name="Rectangle 525"/>
+            <p:cNvPr id="490" name="Rectangle 489"/>
             <p:cNvSpPr/>
             <p:nvPr/>
           </p:nvSpPr>
@@ -6549,13 +6981,13 @@
       </p:grpSp>
       <p:grpSp>
         <p:nvGrpSpPr>
-          <p:cNvPr id="527" name="Group 526"/>
+          <p:cNvPr id="491" name="Group 490"/>
           <p:cNvGrpSpPr/>
           <p:nvPr/>
         </p:nvGrpSpPr>
         <p:grpSpPr>
           <a:xfrm>
-            <a:off x="2131129" y="6469505"/>
+            <a:off x="2598057" y="6469505"/>
             <a:ext cx="534312" cy="501961"/>
             <a:chOff x="2911535" y="1829357"/>
             <a:chExt cx="534312" cy="501961"/>
@@ -6563,7 +6995,7 @@
         </p:grpSpPr>
         <p:sp>
           <p:nvSpPr>
-            <p:cNvPr id="528" name="Rectangle 527"/>
+            <p:cNvPr id="492" name="Rectangle 491"/>
             <p:cNvSpPr/>
             <p:nvPr/>
           </p:nvSpPr>
@@ -6593,7 +7025,7 @@
         </p:sp>
         <p:sp>
           <p:nvSpPr>
-            <p:cNvPr id="529" name="Pentagon 528"/>
+            <p:cNvPr id="493" name="Pentagon 492"/>
             <p:cNvSpPr/>
             <p:nvPr/>
           </p:nvSpPr>
@@ -6641,7 +7073,7 @@
       </p:grpSp>
       <p:pic>
         <p:nvPicPr>
-          <p:cNvPr id="530" name="Picture 529"/>
+          <p:cNvPr id="494" name="Picture 493"/>
           <p:cNvPicPr>
             <a:picLocks noChangeAspect="1"/>
           </p:cNvPicPr>
@@ -6661,7 +7093,7 @@
         </p:blipFill>
         <p:spPr>
           <a:xfrm>
-            <a:off x="1626332" y="7248572"/>
+            <a:off x="2093260" y="7248572"/>
             <a:ext cx="1710478" cy="709961"/>
           </a:xfrm>
           <a:prstGeom prst="rect">
@@ -6671,13 +7103,13 @@
       </p:pic>
       <p:sp>
         <p:nvSpPr>
-          <p:cNvPr id="531" name="Rectangle 530"/>
+          <p:cNvPr id="495" name="Rectangle 494"/>
           <p:cNvSpPr/>
           <p:nvPr/>
         </p:nvSpPr>
         <p:spPr>
           <a:xfrm>
-            <a:off x="2887635" y="7654906"/>
+            <a:off x="3354563" y="7654906"/>
             <a:ext cx="1124830" cy="212111"/>
           </a:xfrm>
           <a:prstGeom prst="rect">
@@ -6705,13 +7137,13 @@
       </p:sp>
       <p:cxnSp>
         <p:nvCxnSpPr>
-          <p:cNvPr id="532" name="Straight Connector 531"/>
+          <p:cNvPr id="496" name="Straight Connector 495"/>
           <p:cNvCxnSpPr/>
           <p:nvPr/>
         </p:nvCxnSpPr>
         <p:spPr>
           <a:xfrm>
-            <a:off x="1966220" y="6939699"/>
+            <a:off x="2433148" y="6939699"/>
             <a:ext cx="122925" cy="296503"/>
           </a:xfrm>
           <a:prstGeom prst="line">
@@ -6741,13 +7173,13 @@
       </p:cxnSp>
       <p:cxnSp>
         <p:nvCxnSpPr>
-          <p:cNvPr id="533" name="Straight Connector 532"/>
+          <p:cNvPr id="497" name="Straight Connector 496"/>
           <p:cNvCxnSpPr/>
           <p:nvPr/>
         </p:nvCxnSpPr>
         <p:spPr>
           <a:xfrm>
-            <a:off x="2487251" y="6909115"/>
+            <a:off x="2954179" y="6909115"/>
             <a:ext cx="321696" cy="473470"/>
           </a:xfrm>
           <a:prstGeom prst="line">
@@ -6777,13 +7209,13 @@
       </p:cxnSp>
       <p:cxnSp>
         <p:nvCxnSpPr>
-          <p:cNvPr id="534" name="Straight Connector 533"/>
+          <p:cNvPr id="498" name="Straight Connector 497"/>
           <p:cNvCxnSpPr/>
           <p:nvPr/>
         </p:nvCxnSpPr>
         <p:spPr>
           <a:xfrm flipH="1">
-            <a:off x="3247715" y="6919722"/>
+            <a:off x="3714643" y="6919722"/>
             <a:ext cx="726" cy="604060"/>
           </a:xfrm>
           <a:prstGeom prst="line">
@@ -6813,7 +7245,7 @@
       </p:cxnSp>
       <p:pic>
         <p:nvPicPr>
-          <p:cNvPr id="535" name="Picture 534"/>
+          <p:cNvPr id="499" name="Picture 498"/>
           <p:cNvPicPr>
             <a:picLocks noChangeAspect="1"/>
           </p:cNvPicPr>
@@ -6827,7 +7259,7 @@
         </p:blipFill>
         <p:spPr>
           <a:xfrm>
-            <a:off x="2584377" y="7450001"/>
+            <a:off x="3051305" y="7450001"/>
             <a:ext cx="553911" cy="200685"/>
           </a:xfrm>
           <a:prstGeom prst="rect">
@@ -6837,13 +7269,13 @@
       </p:pic>
       <p:grpSp>
         <p:nvGrpSpPr>
-          <p:cNvPr id="536" name="Group 535"/>
+          <p:cNvPr id="500" name="Group 499"/>
           <p:cNvGrpSpPr/>
           <p:nvPr/>
         </p:nvGrpSpPr>
         <p:grpSpPr>
           <a:xfrm>
-            <a:off x="1869141" y="7267110"/>
+            <a:off x="2336069" y="7267110"/>
             <a:ext cx="630082" cy="408046"/>
             <a:chOff x="2285615" y="4644795"/>
             <a:chExt cx="940435" cy="609033"/>
@@ -6851,7 +7283,7 @@
         </p:grpSpPr>
         <p:pic>
           <p:nvPicPr>
-            <p:cNvPr id="537" name="Picture 536" descr="hot-dog-bun.png"/>
+            <p:cNvPr id="501" name="Picture 500" descr="hot-dog-bun.png"/>
             <p:cNvPicPr>
               <a:picLocks noChangeAspect="1"/>
             </p:cNvPicPr>
@@ -6881,7 +7313,7 @@
         </p:pic>
         <p:pic>
           <p:nvPicPr>
-            <p:cNvPr id="538" name="Picture 537"/>
+            <p:cNvPr id="502" name="Picture 501"/>
             <p:cNvPicPr>
               <a:picLocks noChangeAspect="1"/>
             </p:cNvPicPr>
@@ -6906,13 +7338,13 @@
       </p:grpSp>
       <p:cxnSp>
         <p:nvCxnSpPr>
-          <p:cNvPr id="539" name="Straight Connector 538"/>
+          <p:cNvPr id="503" name="Straight Connector 502"/>
           <p:cNvCxnSpPr/>
           <p:nvPr/>
         </p:nvCxnSpPr>
         <p:spPr>
           <a:xfrm>
-            <a:off x="246728" y="8116955"/>
+            <a:off x="713656" y="8153240"/>
             <a:ext cx="4976625" cy="0"/>
           </a:xfrm>
           <a:prstGeom prst="line">
@@ -6942,13 +7374,13 @@
       </p:cxnSp>
       <p:grpSp>
         <p:nvGrpSpPr>
-          <p:cNvPr id="540" name="Group 539"/>
+          <p:cNvPr id="504" name="Group 503"/>
           <p:cNvGrpSpPr/>
           <p:nvPr/>
         </p:nvGrpSpPr>
         <p:grpSpPr>
           <a:xfrm>
-            <a:off x="2774212" y="7981272"/>
+            <a:off x="3241140" y="8017557"/>
             <a:ext cx="1027331" cy="507144"/>
             <a:chOff x="2774212" y="6003184"/>
             <a:chExt cx="1027331" cy="507144"/>
@@ -6956,7 +7388,7 @@
         </p:grpSpPr>
         <p:sp>
           <p:nvSpPr>
-            <p:cNvPr id="541" name="Pentagon 540"/>
+            <p:cNvPr id="505" name="Pentagon 504"/>
             <p:cNvSpPr/>
             <p:nvPr/>
           </p:nvSpPr>
@@ -7003,7 +7435,7 @@
         </p:sp>
         <p:sp>
           <p:nvSpPr>
-            <p:cNvPr id="542" name="Rectangle 541"/>
+            <p:cNvPr id="506" name="Rectangle 505"/>
             <p:cNvSpPr/>
             <p:nvPr/>
           </p:nvSpPr>
@@ -7034,7 +7466,7 @@
       </p:grpSp>
       <p:pic>
         <p:nvPicPr>
-          <p:cNvPr id="543" name="Picture 542"/>
+          <p:cNvPr id="507" name="Picture 506"/>
           <p:cNvPicPr>
             <a:picLocks noChangeAspect="1"/>
           </p:cNvPicPr>
@@ -7054,7 +7486,7 @@
         </p:blipFill>
         <p:spPr>
           <a:xfrm>
-            <a:off x="1408682" y="8763228"/>
+            <a:off x="1875610" y="8799513"/>
             <a:ext cx="1710478" cy="709961"/>
           </a:xfrm>
           <a:prstGeom prst="rect">
@@ -7064,13 +7496,13 @@
       </p:pic>
       <p:sp>
         <p:nvSpPr>
-          <p:cNvPr id="544" name="Rectangle 543"/>
+          <p:cNvPr id="508" name="Rectangle 507"/>
           <p:cNvSpPr/>
           <p:nvPr/>
         </p:nvSpPr>
         <p:spPr>
           <a:xfrm>
-            <a:off x="2669985" y="9169562"/>
+            <a:off x="3136913" y="9205847"/>
             <a:ext cx="1124830" cy="212111"/>
           </a:xfrm>
           <a:prstGeom prst="rect">
@@ -7098,13 +7530,13 @@
       </p:sp>
       <p:cxnSp>
         <p:nvCxnSpPr>
-          <p:cNvPr id="545" name="Straight Connector 544"/>
+          <p:cNvPr id="509" name="Straight Connector 508"/>
           <p:cNvCxnSpPr/>
           <p:nvPr/>
         </p:nvCxnSpPr>
         <p:spPr>
           <a:xfrm flipH="1">
-            <a:off x="1914982" y="8449652"/>
+            <a:off x="2381910" y="8485937"/>
             <a:ext cx="113535" cy="326747"/>
           </a:xfrm>
           <a:prstGeom prst="line">
@@ -7134,13 +7566,13 @@
       </p:cxnSp>
       <p:cxnSp>
         <p:nvCxnSpPr>
-          <p:cNvPr id="546" name="Straight Connector 545"/>
+          <p:cNvPr id="510" name="Straight Connector 509"/>
           <p:cNvCxnSpPr/>
           <p:nvPr/>
         </p:nvCxnSpPr>
         <p:spPr>
           <a:xfrm flipH="1">
-            <a:off x="2984705" y="8447922"/>
+            <a:off x="3451633" y="8484207"/>
             <a:ext cx="245618" cy="624183"/>
           </a:xfrm>
           <a:prstGeom prst="line">
@@ -7170,7 +7602,7 @@
       </p:cxnSp>
       <p:pic>
         <p:nvPicPr>
-          <p:cNvPr id="547" name="Picture 546"/>
+          <p:cNvPr id="511" name="Picture 510"/>
           <p:cNvPicPr>
             <a:picLocks noChangeAspect="1"/>
           </p:cNvPicPr>
@@ -7184,7 +7616,7 @@
         </p:blipFill>
         <p:spPr>
           <a:xfrm>
-            <a:off x="2366727" y="8964657"/>
+            <a:off x="2833655" y="9000942"/>
             <a:ext cx="553911" cy="200685"/>
           </a:xfrm>
           <a:prstGeom prst="rect">
@@ -7194,13 +7626,13 @@
       </p:pic>
       <p:grpSp>
         <p:nvGrpSpPr>
-          <p:cNvPr id="548" name="Group 547"/>
+          <p:cNvPr id="512" name="Group 511"/>
           <p:cNvGrpSpPr/>
           <p:nvPr/>
         </p:nvGrpSpPr>
         <p:grpSpPr>
           <a:xfrm>
-            <a:off x="1651491" y="8781766"/>
+            <a:off x="2118419" y="8818051"/>
             <a:ext cx="630082" cy="408046"/>
             <a:chOff x="2285615" y="4644795"/>
             <a:chExt cx="940435" cy="609033"/>
@@ -7208,7 +7640,7 @@
         </p:grpSpPr>
         <p:pic>
           <p:nvPicPr>
-            <p:cNvPr id="549" name="Picture 548" descr="hot-dog-bun.png"/>
+            <p:cNvPr id="513" name="Picture 512" descr="hot-dog-bun.png"/>
             <p:cNvPicPr>
               <a:picLocks noChangeAspect="1"/>
             </p:cNvPicPr>
@@ -7238,7 +7670,7 @@
         </p:pic>
         <p:pic>
           <p:nvPicPr>
-            <p:cNvPr id="550" name="Picture 549"/>
+            <p:cNvPr id="514" name="Picture 513"/>
             <p:cNvPicPr>
               <a:picLocks noChangeAspect="1"/>
             </p:cNvPicPr>
@@ -7263,13 +7695,13 @@
       </p:grpSp>
       <p:grpSp>
         <p:nvGrpSpPr>
-          <p:cNvPr id="551" name="Group 550"/>
+          <p:cNvPr id="515" name="Group 514"/>
           <p:cNvGrpSpPr/>
           <p:nvPr/>
         </p:nvGrpSpPr>
         <p:grpSpPr>
           <a:xfrm>
-            <a:off x="467681" y="7953952"/>
+            <a:off x="934609" y="7990237"/>
             <a:ext cx="784405" cy="528006"/>
             <a:chOff x="1341541" y="5975864"/>
             <a:chExt cx="784405" cy="528006"/>
@@ -7277,7 +7709,7 @@
         </p:grpSpPr>
         <p:sp>
           <p:nvSpPr>
-            <p:cNvPr id="552" name="Rectangle 551"/>
+            <p:cNvPr id="516" name="Rectangle 515"/>
             <p:cNvSpPr/>
             <p:nvPr/>
           </p:nvSpPr>
@@ -7307,7 +7739,7 @@
         </p:sp>
         <p:grpSp>
           <p:nvGrpSpPr>
-            <p:cNvPr id="553" name="Group 552"/>
+            <p:cNvPr id="517" name="Group 516"/>
             <p:cNvGrpSpPr/>
             <p:nvPr/>
           </p:nvGrpSpPr>
@@ -7321,7 +7753,7 @@
           </p:grpSpPr>
           <p:sp>
             <p:nvSpPr>
-              <p:cNvPr id="554" name="Pentagon 553"/>
+              <p:cNvPr id="518" name="Pentagon 517"/>
               <p:cNvSpPr/>
               <p:nvPr/>
             </p:nvSpPr>
@@ -7368,7 +7800,7 @@
           </p:sp>
           <p:cxnSp>
             <p:nvCxnSpPr>
-              <p:cNvPr id="555" name="Straight Connector 554"/>
+              <p:cNvPr id="519" name="Straight Connector 518"/>
               <p:cNvCxnSpPr/>
               <p:nvPr/>
             </p:nvCxnSpPr>
@@ -7404,7 +7836,7 @@
           </p:cxnSp>
           <p:sp>
             <p:nvSpPr>
-              <p:cNvPr id="556" name="Connector 555"/>
+              <p:cNvPr id="520" name="Connector 519"/>
               <p:cNvSpPr/>
               <p:nvPr/>
             </p:nvSpPr>
@@ -7453,13 +7885,13 @@
       </p:grpSp>
       <p:cxnSp>
         <p:nvCxnSpPr>
-          <p:cNvPr id="557" name="Straight Connector 556"/>
+          <p:cNvPr id="521" name="Straight Connector 520"/>
           <p:cNvCxnSpPr/>
           <p:nvPr/>
         </p:nvCxnSpPr>
         <p:spPr>
           <a:xfrm>
-            <a:off x="2162606" y="8499934"/>
+            <a:off x="2629534" y="8536219"/>
             <a:ext cx="453835" cy="445205"/>
           </a:xfrm>
           <a:prstGeom prst="line">
@@ -7489,13 +7921,13 @@
       </p:cxnSp>
       <p:grpSp>
         <p:nvGrpSpPr>
-          <p:cNvPr id="558" name="Group 557"/>
+          <p:cNvPr id="522" name="Group 521"/>
           <p:cNvGrpSpPr/>
           <p:nvPr/>
         </p:nvGrpSpPr>
         <p:grpSpPr>
           <a:xfrm>
-            <a:off x="1240430" y="8255609"/>
+            <a:off x="1707358" y="8291894"/>
             <a:ext cx="1427425" cy="307777"/>
             <a:chOff x="1381522" y="6152484"/>
             <a:chExt cx="1427425" cy="307777"/>
@@ -7503,7 +7935,7 @@
         </p:grpSpPr>
         <p:sp>
           <p:nvSpPr>
-            <p:cNvPr id="559" name="Oval 558"/>
+            <p:cNvPr id="523" name="Oval 522"/>
             <p:cNvSpPr/>
             <p:nvPr/>
           </p:nvSpPr>
@@ -7554,7 +7986,7 @@
         </p:sp>
         <p:sp>
           <p:nvSpPr>
-            <p:cNvPr id="560" name="Rectangle 559"/>
+            <p:cNvPr id="524" name="Rectangle 523"/>
             <p:cNvSpPr/>
             <p:nvPr/>
           </p:nvSpPr>
@@ -7585,13 +8017,13 @@
       </p:grpSp>
       <p:sp>
         <p:nvSpPr>
-          <p:cNvPr id="561" name="Rectangle 560"/>
+          <p:cNvPr id="525" name="Rectangle 524"/>
           <p:cNvSpPr/>
           <p:nvPr/>
         </p:nvSpPr>
         <p:spPr>
           <a:xfrm>
-            <a:off x="1505524" y="8512747"/>
+            <a:off x="1972452" y="8549032"/>
             <a:ext cx="486915" cy="307777"/>
           </a:xfrm>
           <a:prstGeom prst="rect">
@@ -7615,13 +8047,13 @@
       </p:sp>
       <p:sp>
         <p:nvSpPr>
-          <p:cNvPr id="562" name="Rectangle 561"/>
+          <p:cNvPr id="526" name="Rectangle 525"/>
           <p:cNvSpPr/>
           <p:nvPr/>
         </p:nvSpPr>
         <p:spPr>
           <a:xfrm>
-            <a:off x="2305394" y="8512747"/>
+            <a:off x="2772322" y="8549032"/>
             <a:ext cx="486915" cy="307777"/>
           </a:xfrm>
           <a:prstGeom prst="rect">
@@ -7645,13 +8077,13 @@
       </p:sp>
       <p:cxnSp>
         <p:nvCxnSpPr>
-          <p:cNvPr id="563" name="Straight Connector 562"/>
+          <p:cNvPr id="527" name="Straight Connector 526"/>
           <p:cNvCxnSpPr/>
           <p:nvPr/>
         </p:nvCxnSpPr>
         <p:spPr>
           <a:xfrm>
-            <a:off x="246728" y="5033685"/>
+            <a:off x="713656" y="5033685"/>
             <a:ext cx="4976625" cy="0"/>
           </a:xfrm>
           <a:prstGeom prst="line">
@@ -7681,13 +8113,13 @@
       </p:cxnSp>
       <p:grpSp>
         <p:nvGrpSpPr>
-          <p:cNvPr id="564" name="Group 563"/>
+          <p:cNvPr id="528" name="Group 527"/>
           <p:cNvGrpSpPr/>
           <p:nvPr/>
         </p:nvGrpSpPr>
         <p:grpSpPr>
           <a:xfrm>
-            <a:off x="1480667" y="4898002"/>
+            <a:off x="1947595" y="4898002"/>
             <a:ext cx="668867" cy="500686"/>
             <a:chOff x="2688039" y="1826468"/>
             <a:chExt cx="668867" cy="500686"/>
@@ -7695,7 +8127,7 @@
         </p:grpSpPr>
         <p:sp>
           <p:nvSpPr>
-            <p:cNvPr id="565" name="Pentagon 564"/>
+            <p:cNvPr id="529" name="Pentagon 528"/>
             <p:cNvSpPr/>
             <p:nvPr/>
           </p:nvSpPr>
@@ -7742,7 +8174,7 @@
         </p:sp>
         <p:sp>
           <p:nvSpPr>
-            <p:cNvPr id="566" name="Rectangle 565"/>
+            <p:cNvPr id="530" name="Rectangle 529"/>
             <p:cNvSpPr/>
             <p:nvPr/>
           </p:nvSpPr>
@@ -7773,13 +8205,13 @@
       </p:grpSp>
       <p:grpSp>
         <p:nvGrpSpPr>
-          <p:cNvPr id="567" name="Group 566"/>
+          <p:cNvPr id="531" name="Group 530"/>
           <p:cNvGrpSpPr/>
           <p:nvPr/>
         </p:nvGrpSpPr>
         <p:grpSpPr>
           <a:xfrm>
-            <a:off x="354191" y="4898002"/>
+            <a:off x="821119" y="4898002"/>
             <a:ext cx="1027331" cy="504276"/>
             <a:chOff x="1134597" y="1826468"/>
             <a:chExt cx="1027331" cy="504276"/>
@@ -7787,7 +8219,7 @@
         </p:grpSpPr>
         <p:sp>
           <p:nvSpPr>
-            <p:cNvPr id="568" name="Pentagon 567"/>
+            <p:cNvPr id="532" name="Pentagon 531"/>
             <p:cNvSpPr/>
             <p:nvPr/>
           </p:nvSpPr>
@@ -7834,7 +8266,7 @@
         </p:sp>
         <p:sp>
           <p:nvSpPr>
-            <p:cNvPr id="569" name="Rectangle 568"/>
+            <p:cNvPr id="533" name="Rectangle 532"/>
             <p:cNvSpPr/>
             <p:nvPr/>
           </p:nvSpPr>
@@ -7865,13 +8297,13 @@
       </p:grpSp>
       <p:grpSp>
         <p:nvGrpSpPr>
-          <p:cNvPr id="570" name="Group 569"/>
+          <p:cNvPr id="534" name="Group 533"/>
           <p:cNvGrpSpPr/>
           <p:nvPr/>
         </p:nvGrpSpPr>
         <p:grpSpPr>
           <a:xfrm>
-            <a:off x="2131129" y="4900891"/>
+            <a:off x="2598057" y="4900891"/>
             <a:ext cx="534312" cy="501961"/>
             <a:chOff x="2911535" y="1829357"/>
             <a:chExt cx="534312" cy="501961"/>
@@ -7879,7 +8311,7 @@
         </p:grpSpPr>
         <p:sp>
           <p:nvSpPr>
-            <p:cNvPr id="571" name="Rectangle 570"/>
+            <p:cNvPr id="535" name="Rectangle 534"/>
             <p:cNvSpPr/>
             <p:nvPr/>
           </p:nvSpPr>
@@ -7909,7 +8341,7 @@
         </p:sp>
         <p:sp>
           <p:nvSpPr>
-            <p:cNvPr id="572" name="Pentagon 571"/>
+            <p:cNvPr id="536" name="Pentagon 535"/>
             <p:cNvSpPr/>
             <p:nvPr/>
           </p:nvSpPr>
@@ -7957,7 +8389,7 @@
       </p:grpSp>
       <p:pic>
         <p:nvPicPr>
-          <p:cNvPr id="573" name="Picture 572"/>
+          <p:cNvPr id="537" name="Picture 536"/>
           <p:cNvPicPr>
             <a:picLocks noChangeAspect="1"/>
           </p:cNvPicPr>
@@ -7977,7 +8409,7 @@
         </p:blipFill>
         <p:spPr>
           <a:xfrm>
-            <a:off x="925530" y="5701574"/>
+            <a:off x="1392458" y="5701574"/>
             <a:ext cx="1605943" cy="681802"/>
           </a:xfrm>
           <a:prstGeom prst="rect">
@@ -7987,13 +8419,13 @@
       </p:pic>
       <p:sp>
         <p:nvSpPr>
-          <p:cNvPr id="574" name="Rectangle 573"/>
+          <p:cNvPr id="538" name="Rectangle 537"/>
           <p:cNvSpPr/>
           <p:nvPr/>
         </p:nvSpPr>
         <p:spPr>
           <a:xfrm>
-            <a:off x="105886" y="6027845"/>
+            <a:off x="572814" y="6027845"/>
             <a:ext cx="1190119" cy="307777"/>
           </a:xfrm>
           <a:prstGeom prst="rect">
@@ -8021,7 +8453,7 @@
       </p:sp>
       <p:pic>
         <p:nvPicPr>
-          <p:cNvPr id="575" name="Picture 574"/>
+          <p:cNvPr id="539" name="Picture 538"/>
           <p:cNvPicPr>
             <a:picLocks noChangeAspect="1"/>
           </p:cNvPicPr>
@@ -8035,7 +8467,7 @@
         </p:blipFill>
         <p:spPr>
           <a:xfrm>
-            <a:off x="1813655" y="5880799"/>
+            <a:off x="2280583" y="5880799"/>
             <a:ext cx="553911" cy="200685"/>
           </a:xfrm>
           <a:prstGeom prst="rect">
@@ -8045,13 +8477,13 @@
       </p:pic>
       <p:grpSp>
         <p:nvGrpSpPr>
-          <p:cNvPr id="576" name="Group 575"/>
+          <p:cNvPr id="540" name="Group 539"/>
           <p:cNvGrpSpPr/>
           <p:nvPr/>
         </p:nvGrpSpPr>
         <p:grpSpPr>
           <a:xfrm>
-            <a:off x="1098419" y="5697908"/>
+            <a:off x="1565347" y="5697908"/>
             <a:ext cx="630082" cy="408046"/>
             <a:chOff x="2285615" y="4644795"/>
             <a:chExt cx="940435" cy="609033"/>
@@ -8059,7 +8491,7 @@
         </p:grpSpPr>
         <p:pic>
           <p:nvPicPr>
-            <p:cNvPr id="577" name="Picture 576" descr="hot-dog-bun.png"/>
+            <p:cNvPr id="541" name="Picture 540" descr="hot-dog-bun.png"/>
             <p:cNvPicPr>
               <a:picLocks noChangeAspect="1"/>
             </p:cNvPicPr>
@@ -8089,7 +8521,7 @@
         </p:pic>
         <p:pic>
           <p:nvPicPr>
-            <p:cNvPr id="578" name="Picture 577"/>
+            <p:cNvPr id="542" name="Picture 541"/>
             <p:cNvPicPr>
               <a:picLocks noChangeAspect="1"/>
             </p:cNvPicPr>
@@ -8114,13 +8546,13 @@
       </p:grpSp>
       <p:cxnSp>
         <p:nvCxnSpPr>
-          <p:cNvPr id="579" name="Straight Connector 578"/>
+          <p:cNvPr id="543" name="Straight Connector 542"/>
           <p:cNvCxnSpPr/>
           <p:nvPr/>
         </p:nvCxnSpPr>
         <p:spPr>
           <a:xfrm>
-            <a:off x="844400" y="5382993"/>
+            <a:off x="1311328" y="5382993"/>
             <a:ext cx="145249" cy="555618"/>
           </a:xfrm>
           <a:prstGeom prst="line">
@@ -8150,13 +8582,13 @@
       </p:cxnSp>
       <p:cxnSp>
         <p:nvCxnSpPr>
-          <p:cNvPr id="580" name="Straight Connector 579"/>
+          <p:cNvPr id="544" name="Straight Connector 543"/>
           <p:cNvCxnSpPr/>
           <p:nvPr/>
         </p:nvCxnSpPr>
         <p:spPr>
           <a:xfrm flipH="1">
-            <a:off x="2125947" y="5353883"/>
+            <a:off x="2592875" y="5353883"/>
             <a:ext cx="252083" cy="508384"/>
           </a:xfrm>
           <a:prstGeom prst="line">
@@ -8186,13 +8618,13 @@
       </p:cxnSp>
       <p:cxnSp>
         <p:nvCxnSpPr>
-          <p:cNvPr id="581" name="Straight Connector 580"/>
+          <p:cNvPr id="545" name="Straight Connector 544"/>
           <p:cNvCxnSpPr/>
           <p:nvPr/>
         </p:nvCxnSpPr>
         <p:spPr>
           <a:xfrm flipH="1">
-            <a:off x="1481524" y="5368416"/>
+            <a:off x="1948452" y="5368416"/>
             <a:ext cx="174024" cy="323434"/>
           </a:xfrm>
           <a:prstGeom prst="line">
@@ -8220,115 +8652,15 @@
           </a:fontRef>
         </p:style>
       </p:cxnSp>
-      <p:pic>
-        <p:nvPicPr>
-          <p:cNvPr id="582" name="Picture 581"/>
-          <p:cNvPicPr>
-            <a:picLocks noChangeAspect="1"/>
-          </p:cNvPicPr>
-          <p:nvPr/>
-        </p:nvPicPr>
-        <p:blipFill>
-          <a:blip r:embed="rId5">
-            <a:extLst>
-              <a:ext uri="{28A0092B-C50C-407E-A947-70E740481C1C}">
-                <a14:useLocalDpi xmlns:a14="http://schemas.microsoft.com/office/drawing/2010/main" val="0"/>
-              </a:ext>
-            </a:extLst>
-          </a:blip>
-          <a:stretch>
-            <a:fillRect/>
-          </a:stretch>
-        </p:blipFill>
-        <p:spPr>
-          <a:xfrm>
-            <a:off x="3092146" y="5681783"/>
-            <a:ext cx="1710478" cy="709961"/>
-          </a:xfrm>
-          <a:prstGeom prst="rect">
-            <a:avLst/>
-          </a:prstGeom>
-        </p:spPr>
-      </p:pic>
-      <p:sp>
-        <p:nvSpPr>
-          <p:cNvPr id="583" name="Rectangle 582"/>
-          <p:cNvSpPr/>
-          <p:nvPr/>
-        </p:nvSpPr>
-        <p:spPr>
-          <a:xfrm>
-            <a:off x="4353449" y="6088118"/>
-            <a:ext cx="1124830" cy="212111"/>
-          </a:xfrm>
-          <a:prstGeom prst="rect">
-            <a:avLst/>
-          </a:prstGeom>
-        </p:spPr>
-        <p:txBody>
-          <a:bodyPr wrap="square">
-            <a:spAutoFit/>
-          </a:bodyPr>
-          <a:lstStyle/>
-          <a:p>
-            <a:pPr algn="ctr"/>
-            <a:r>
-              <a:rPr lang="en-US" b="1" dirty="0" smtClean="0"/>
-              <a:t>Co-</a:t>
-            </a:r>
-            <a:r>
-              <a:rPr lang="en-US" b="1" dirty="0" err="1" smtClean="0"/>
-              <a:t>chelatase</a:t>
-            </a:r>
-            <a:endParaRPr lang="en-US" b="1" dirty="0"/>
-          </a:p>
-        </p:txBody>
-      </p:sp>
       <p:cxnSp>
         <p:nvCxnSpPr>
-          <p:cNvPr id="584" name="Straight Connector 583"/>
+          <p:cNvPr id="546" name="Straight Connector 545"/>
           <p:cNvCxnSpPr/>
           <p:nvPr/>
         </p:nvCxnSpPr>
         <p:spPr>
           <a:xfrm>
-            <a:off x="4236728" y="5499583"/>
-            <a:ext cx="428933" cy="436976"/>
-          </a:xfrm>
-          <a:prstGeom prst="line">
-            <a:avLst/>
-          </a:prstGeom>
-          <a:ln>
-            <a:solidFill>
-              <a:srgbClr val="000000"/>
-            </a:solidFill>
-            <a:tailEnd type="triangle"/>
-          </a:ln>
-        </p:spPr>
-        <p:style>
-          <a:lnRef idx="1">
-            <a:schemeClr val="accent1"/>
-          </a:lnRef>
-          <a:fillRef idx="0">
-            <a:schemeClr val="accent1"/>
-          </a:fillRef>
-          <a:effectRef idx="0">
-            <a:schemeClr val="accent1"/>
-          </a:effectRef>
-          <a:fontRef idx="minor">
-            <a:schemeClr val="tx1"/>
-          </a:fontRef>
-        </p:style>
-      </p:cxnSp>
-      <p:cxnSp>
-        <p:nvCxnSpPr>
-          <p:cNvPr id="585" name="Straight Connector 584"/>
-          <p:cNvCxnSpPr/>
-          <p:nvPr/>
-        </p:nvCxnSpPr>
-        <p:spPr>
-          <a:xfrm>
-            <a:off x="1218318" y="9755666"/>
+            <a:off x="1685246" y="9755666"/>
             <a:ext cx="774121" cy="233819"/>
           </a:xfrm>
           <a:prstGeom prst="line">
@@ -8358,13 +8690,13 @@
       </p:cxnSp>
       <p:cxnSp>
         <p:nvCxnSpPr>
-          <p:cNvPr id="586" name="Straight Connector 585"/>
+          <p:cNvPr id="547" name="Straight Connector 546"/>
           <p:cNvCxnSpPr/>
           <p:nvPr/>
         </p:nvCxnSpPr>
         <p:spPr>
           <a:xfrm>
-            <a:off x="246728" y="9696943"/>
+            <a:off x="713656" y="9696943"/>
             <a:ext cx="4976625" cy="0"/>
           </a:xfrm>
           <a:prstGeom prst="line">
@@ -8394,13 +8726,13 @@
       </p:cxnSp>
       <p:grpSp>
         <p:nvGrpSpPr>
-          <p:cNvPr id="587" name="Group 586"/>
+          <p:cNvPr id="548" name="Group 547"/>
           <p:cNvGrpSpPr/>
           <p:nvPr/>
         </p:nvGrpSpPr>
         <p:grpSpPr>
           <a:xfrm>
-            <a:off x="2774212" y="9561260"/>
+            <a:off x="3241140" y="9561260"/>
             <a:ext cx="1027331" cy="507144"/>
             <a:chOff x="2774212" y="6003184"/>
             <a:chExt cx="1027331" cy="507144"/>
@@ -8408,7 +8740,7 @@
         </p:grpSpPr>
         <p:sp>
           <p:nvSpPr>
-            <p:cNvPr id="588" name="Pentagon 587"/>
+            <p:cNvPr id="549" name="Pentagon 548"/>
             <p:cNvSpPr/>
             <p:nvPr/>
           </p:nvSpPr>
@@ -8455,7 +8787,7 @@
         </p:sp>
         <p:sp>
           <p:nvSpPr>
-            <p:cNvPr id="589" name="Rectangle 588"/>
+            <p:cNvPr id="550" name="Rectangle 549"/>
             <p:cNvSpPr/>
             <p:nvPr/>
           </p:nvSpPr>
@@ -8486,7 +8818,7 @@
       </p:grpSp>
       <p:pic>
         <p:nvPicPr>
-          <p:cNvPr id="590" name="Picture 589"/>
+          <p:cNvPr id="551" name="Picture 550"/>
           <p:cNvPicPr>
             <a:picLocks noChangeAspect="1"/>
           </p:cNvPicPr>
@@ -8506,7 +8838,7 @@
         </p:blipFill>
         <p:spPr>
           <a:xfrm>
-            <a:off x="1408682" y="10343216"/>
+            <a:off x="1875610" y="10343216"/>
             <a:ext cx="1710478" cy="709961"/>
           </a:xfrm>
           <a:prstGeom prst="rect">
@@ -8516,13 +8848,13 @@
       </p:pic>
       <p:sp>
         <p:nvSpPr>
-          <p:cNvPr id="591" name="Rectangle 590"/>
+          <p:cNvPr id="552" name="Rectangle 551"/>
           <p:cNvSpPr/>
           <p:nvPr/>
         </p:nvSpPr>
         <p:spPr>
           <a:xfrm>
-            <a:off x="2669985" y="10749550"/>
+            <a:off x="3136913" y="10749550"/>
             <a:ext cx="1124830" cy="212111"/>
           </a:xfrm>
           <a:prstGeom prst="rect">
@@ -8550,13 +8882,13 @@
       </p:sp>
       <p:cxnSp>
         <p:nvCxnSpPr>
-          <p:cNvPr id="592" name="Straight Connector 591"/>
+          <p:cNvPr id="553" name="Straight Connector 552"/>
           <p:cNvCxnSpPr/>
           <p:nvPr/>
         </p:nvCxnSpPr>
         <p:spPr>
           <a:xfrm flipH="1">
-            <a:off x="1914982" y="10029640"/>
+            <a:off x="2381910" y="10029640"/>
             <a:ext cx="113535" cy="326747"/>
           </a:xfrm>
           <a:prstGeom prst="line">
@@ -8586,13 +8918,13 @@
       </p:cxnSp>
       <p:cxnSp>
         <p:nvCxnSpPr>
-          <p:cNvPr id="593" name="Straight Connector 592"/>
+          <p:cNvPr id="554" name="Straight Connector 553"/>
           <p:cNvCxnSpPr/>
           <p:nvPr/>
         </p:nvCxnSpPr>
         <p:spPr>
           <a:xfrm flipH="1">
-            <a:off x="2984705" y="10027910"/>
+            <a:off x="3451633" y="10027910"/>
             <a:ext cx="245618" cy="624183"/>
           </a:xfrm>
           <a:prstGeom prst="line">
@@ -8622,7 +8954,7 @@
       </p:cxnSp>
       <p:pic>
         <p:nvPicPr>
-          <p:cNvPr id="594" name="Picture 593"/>
+          <p:cNvPr id="555" name="Picture 554"/>
           <p:cNvPicPr>
             <a:picLocks noChangeAspect="1"/>
           </p:cNvPicPr>
@@ -8636,7 +8968,7 @@
         </p:blipFill>
         <p:spPr>
           <a:xfrm>
-            <a:off x="2366727" y="10544645"/>
+            <a:off x="2833655" y="10544645"/>
             <a:ext cx="553911" cy="200685"/>
           </a:xfrm>
           <a:prstGeom prst="rect">
@@ -8646,13 +8978,13 @@
       </p:pic>
       <p:grpSp>
         <p:nvGrpSpPr>
-          <p:cNvPr id="595" name="Group 594"/>
+          <p:cNvPr id="556" name="Group 555"/>
           <p:cNvGrpSpPr/>
           <p:nvPr/>
         </p:nvGrpSpPr>
         <p:grpSpPr>
           <a:xfrm>
-            <a:off x="1651491" y="10361754"/>
+            <a:off x="2118419" y="10361754"/>
             <a:ext cx="630082" cy="408046"/>
             <a:chOff x="2285615" y="4644795"/>
             <a:chExt cx="940435" cy="609033"/>
@@ -8660,7 +8992,7 @@
         </p:grpSpPr>
         <p:pic>
           <p:nvPicPr>
-            <p:cNvPr id="596" name="Picture 595" descr="hot-dog-bun.png"/>
+            <p:cNvPr id="557" name="Picture 556" descr="hot-dog-bun.png"/>
             <p:cNvPicPr>
               <a:picLocks noChangeAspect="1"/>
             </p:cNvPicPr>
@@ -8690,7 +9022,7 @@
         </p:pic>
         <p:pic>
           <p:nvPicPr>
-            <p:cNvPr id="597" name="Picture 596"/>
+            <p:cNvPr id="558" name="Picture 557"/>
             <p:cNvPicPr>
               <a:picLocks noChangeAspect="1"/>
             </p:cNvPicPr>
@@ -8715,13 +9047,13 @@
       </p:grpSp>
       <p:grpSp>
         <p:nvGrpSpPr>
-          <p:cNvPr id="598" name="Group 597"/>
+          <p:cNvPr id="559" name="Group 558"/>
           <p:cNvGrpSpPr/>
           <p:nvPr/>
         </p:nvGrpSpPr>
         <p:grpSpPr>
           <a:xfrm>
-            <a:off x="467681" y="9561642"/>
+            <a:off x="934609" y="9561642"/>
             <a:ext cx="784405" cy="500304"/>
             <a:chOff x="1341541" y="6003566"/>
             <a:chExt cx="784405" cy="500304"/>
@@ -8729,7 +9061,7 @@
         </p:grpSpPr>
         <p:sp>
           <p:nvSpPr>
-            <p:cNvPr id="599" name="Rectangle 598"/>
+            <p:cNvPr id="560" name="Rectangle 559"/>
             <p:cNvSpPr/>
             <p:nvPr/>
           </p:nvSpPr>
@@ -8759,7 +9091,7 @@
         </p:sp>
         <p:grpSp>
           <p:nvGrpSpPr>
-            <p:cNvPr id="600" name="Group 599"/>
+            <p:cNvPr id="561" name="Group 560"/>
             <p:cNvGrpSpPr/>
             <p:nvPr/>
           </p:nvGrpSpPr>
@@ -8773,7 +9105,7 @@
           </p:grpSpPr>
           <p:sp>
             <p:nvSpPr>
-              <p:cNvPr id="601" name="Pentagon 600"/>
+              <p:cNvPr id="562" name="Pentagon 561"/>
               <p:cNvSpPr/>
               <p:nvPr/>
             </p:nvSpPr>
@@ -8820,7 +9152,7 @@
           </p:sp>
           <p:cxnSp>
             <p:nvCxnSpPr>
-              <p:cNvPr id="602" name="Straight Connector 601"/>
+              <p:cNvPr id="563" name="Straight Connector 562"/>
               <p:cNvCxnSpPr/>
               <p:nvPr/>
             </p:nvCxnSpPr>
@@ -8858,13 +9190,13 @@
       </p:grpSp>
       <p:cxnSp>
         <p:nvCxnSpPr>
-          <p:cNvPr id="603" name="Straight Connector 602"/>
+          <p:cNvPr id="564" name="Straight Connector 563"/>
           <p:cNvCxnSpPr/>
           <p:nvPr/>
         </p:nvCxnSpPr>
         <p:spPr>
           <a:xfrm>
-            <a:off x="2162606" y="10079922"/>
+            <a:off x="2629534" y="10079922"/>
             <a:ext cx="453835" cy="445205"/>
           </a:xfrm>
           <a:prstGeom prst="line">
@@ -8894,13 +9226,13 @@
       </p:cxnSp>
       <p:grpSp>
         <p:nvGrpSpPr>
-          <p:cNvPr id="604" name="Group 603"/>
+          <p:cNvPr id="565" name="Group 564"/>
           <p:cNvGrpSpPr/>
           <p:nvPr/>
         </p:nvGrpSpPr>
         <p:grpSpPr>
           <a:xfrm>
-            <a:off x="1240430" y="9835597"/>
+            <a:off x="1707358" y="9835597"/>
             <a:ext cx="1427425" cy="307777"/>
             <a:chOff x="1381522" y="6152484"/>
             <a:chExt cx="1427425" cy="307777"/>
@@ -8908,7 +9240,7 @@
         </p:grpSpPr>
         <p:sp>
           <p:nvSpPr>
-            <p:cNvPr id="605" name="Oval 604"/>
+            <p:cNvPr id="566" name="Oval 565"/>
             <p:cNvSpPr/>
             <p:nvPr/>
           </p:nvSpPr>
@@ -8959,7 +9291,7 @@
         </p:sp>
         <p:sp>
           <p:nvSpPr>
-            <p:cNvPr id="606" name="Rectangle 605"/>
+            <p:cNvPr id="567" name="Rectangle 566"/>
             <p:cNvSpPr/>
             <p:nvPr/>
           </p:nvSpPr>
@@ -8990,13 +9322,13 @@
       </p:grpSp>
       <p:sp>
         <p:nvSpPr>
-          <p:cNvPr id="607" name="Rectangle 606"/>
+          <p:cNvPr id="568" name="Rectangle 567"/>
           <p:cNvSpPr/>
           <p:nvPr/>
         </p:nvSpPr>
         <p:spPr>
           <a:xfrm>
-            <a:off x="1505524" y="10092735"/>
+            <a:off x="1972452" y="10092735"/>
             <a:ext cx="486915" cy="307777"/>
           </a:xfrm>
           <a:prstGeom prst="rect">
@@ -9020,13 +9352,13 @@
       </p:sp>
       <p:sp>
         <p:nvSpPr>
-          <p:cNvPr id="608" name="Rectangle 607"/>
+          <p:cNvPr id="569" name="Rectangle 568"/>
           <p:cNvSpPr/>
           <p:nvPr/>
         </p:nvSpPr>
         <p:spPr>
           <a:xfrm>
-            <a:off x="2305394" y="10092735"/>
+            <a:off x="2772322" y="10092735"/>
             <a:ext cx="486915" cy="307777"/>
           </a:xfrm>
           <a:prstGeom prst="rect">
@@ -9048,54 +9380,30 @@
           </a:p>
         </p:txBody>
       </p:sp>
-      <p:pic>
-        <p:nvPicPr>
-          <p:cNvPr id="609" name="Picture 608"/>
-          <p:cNvPicPr>
-            <a:picLocks noChangeAspect="1"/>
-          </p:cNvPicPr>
-          <p:nvPr/>
-        </p:nvPicPr>
-        <p:blipFill>
-          <a:blip r:embed="rId3"/>
-          <a:stretch>
-            <a:fillRect/>
-          </a:stretch>
-        </p:blipFill>
-        <p:spPr>
-          <a:xfrm>
-            <a:off x="4027466" y="5909674"/>
-            <a:ext cx="553911" cy="200685"/>
-          </a:xfrm>
-          <a:prstGeom prst="rect">
-            <a:avLst/>
-          </a:prstGeom>
-        </p:spPr>
-      </p:pic>
       <p:grpSp>
         <p:nvGrpSpPr>
-          <p:cNvPr id="610" name="Group 609"/>
+          <p:cNvPr id="570" name="Group 569"/>
           <p:cNvGrpSpPr/>
           <p:nvPr/>
         </p:nvGrpSpPr>
         <p:grpSpPr>
           <a:xfrm>
-            <a:off x="3312230" y="5726783"/>
-            <a:ext cx="630082" cy="408046"/>
-            <a:chOff x="2285615" y="4644795"/>
-            <a:chExt cx="940435" cy="609033"/>
+            <a:off x="3401344" y="5681783"/>
+            <a:ext cx="2386133" cy="709961"/>
+            <a:chOff x="3092146" y="5681783"/>
+            <a:chExt cx="2386133" cy="709961"/>
           </a:xfrm>
         </p:grpSpPr>
         <p:pic>
           <p:nvPicPr>
-            <p:cNvPr id="611" name="Picture 610" descr="hot-dog-bun.png"/>
+            <p:cNvPr id="571" name="Picture 570"/>
             <p:cNvPicPr>
               <a:picLocks noChangeAspect="1"/>
             </p:cNvPicPr>
             <p:nvPr/>
           </p:nvPicPr>
           <p:blipFill>
-            <a:blip r:embed="rId4">
+            <a:blip r:embed="rId5">
               <a:extLst>
                 <a:ext uri="{28A0092B-C50C-407E-A947-70E740481C1C}">
                   <a14:useLocalDpi xmlns:a14="http://schemas.microsoft.com/office/drawing/2010/main" val="0"/>
@@ -9108,17 +9416,51 @@
           </p:blipFill>
           <p:spPr>
             <a:xfrm>
-              <a:off x="2285615" y="4781973"/>
-              <a:ext cx="940435" cy="471855"/>
+              <a:off x="3092146" y="5681783"/>
+              <a:ext cx="1710478" cy="709961"/>
             </a:xfrm>
             <a:prstGeom prst="rect">
               <a:avLst/>
             </a:prstGeom>
           </p:spPr>
         </p:pic>
+        <p:sp>
+          <p:nvSpPr>
+            <p:cNvPr id="572" name="Rectangle 571"/>
+            <p:cNvSpPr/>
+            <p:nvPr/>
+          </p:nvSpPr>
+          <p:spPr>
+            <a:xfrm>
+              <a:off x="4353449" y="6088118"/>
+              <a:ext cx="1124830" cy="212111"/>
+            </a:xfrm>
+            <a:prstGeom prst="rect">
+              <a:avLst/>
+            </a:prstGeom>
+          </p:spPr>
+          <p:txBody>
+            <a:bodyPr wrap="square">
+              <a:spAutoFit/>
+            </a:bodyPr>
+            <a:lstStyle/>
+            <a:p>
+              <a:pPr algn="ctr"/>
+              <a:r>
+                <a:rPr lang="en-US" b="1" dirty="0" smtClean="0"/>
+                <a:t>Co-</a:t>
+              </a:r>
+              <a:r>
+                <a:rPr lang="en-US" b="1" dirty="0" err="1" smtClean="0"/>
+                <a:t>chelatase</a:t>
+              </a:r>
+              <a:endParaRPr lang="en-US" b="1" dirty="0"/>
+            </a:p>
+          </p:txBody>
+        </p:sp>
         <p:pic>
           <p:nvPicPr>
-            <p:cNvPr id="612" name="Picture 611"/>
+            <p:cNvPr id="573" name="Picture 572"/>
             <p:cNvPicPr>
               <a:picLocks noChangeAspect="1"/>
             </p:cNvPicPr>
@@ -9132,24 +9474,93 @@
           </p:blipFill>
           <p:spPr>
             <a:xfrm>
-              <a:off x="2352789" y="4644795"/>
-              <a:ext cx="828478" cy="300160"/>
+              <a:off x="4027466" y="5909674"/>
+              <a:ext cx="553911" cy="200685"/>
             </a:xfrm>
             <a:prstGeom prst="rect">
               <a:avLst/>
             </a:prstGeom>
           </p:spPr>
         </p:pic>
+        <p:grpSp>
+          <p:nvGrpSpPr>
+            <p:cNvPr id="574" name="Group 573"/>
+            <p:cNvGrpSpPr/>
+            <p:nvPr/>
+          </p:nvGrpSpPr>
+          <p:grpSpPr>
+            <a:xfrm>
+              <a:off x="3312230" y="5726783"/>
+              <a:ext cx="630082" cy="408046"/>
+              <a:chOff x="2285615" y="4644795"/>
+              <a:chExt cx="940435" cy="609033"/>
+            </a:xfrm>
+          </p:grpSpPr>
+          <p:pic>
+            <p:nvPicPr>
+              <p:cNvPr id="575" name="Picture 574" descr="hot-dog-bun.png"/>
+              <p:cNvPicPr>
+                <a:picLocks noChangeAspect="1"/>
+              </p:cNvPicPr>
+              <p:nvPr/>
+            </p:nvPicPr>
+            <p:blipFill>
+              <a:blip r:embed="rId4">
+                <a:extLst>
+                  <a:ext uri="{28A0092B-C50C-407E-A947-70E740481C1C}">
+                    <a14:useLocalDpi xmlns:a14="http://schemas.microsoft.com/office/drawing/2010/main" val="0"/>
+                  </a:ext>
+                </a:extLst>
+              </a:blip>
+              <a:stretch>
+                <a:fillRect/>
+              </a:stretch>
+            </p:blipFill>
+            <p:spPr>
+              <a:xfrm>
+                <a:off x="2285615" y="4781973"/>
+                <a:ext cx="940435" cy="471855"/>
+              </a:xfrm>
+              <a:prstGeom prst="rect">
+                <a:avLst/>
+              </a:prstGeom>
+            </p:spPr>
+          </p:pic>
+          <p:pic>
+            <p:nvPicPr>
+              <p:cNvPr id="576" name="Picture 575"/>
+              <p:cNvPicPr>
+                <a:picLocks noChangeAspect="1"/>
+              </p:cNvPicPr>
+              <p:nvPr/>
+            </p:nvPicPr>
+            <p:blipFill>
+              <a:blip r:embed="rId3"/>
+              <a:stretch>
+                <a:fillRect/>
+              </a:stretch>
+            </p:blipFill>
+            <p:spPr>
+              <a:xfrm>
+                <a:off x="2352789" y="4644795"/>
+                <a:ext cx="828478" cy="300160"/>
+              </a:xfrm>
+              <a:prstGeom prst="rect">
+                <a:avLst/>
+              </a:prstGeom>
+            </p:spPr>
+          </p:pic>
+        </p:grpSp>
       </p:grpSp>
       <p:cxnSp>
         <p:nvCxnSpPr>
-          <p:cNvPr id="613" name="Straight Connector 612"/>
+          <p:cNvPr id="577" name="Straight Connector 576"/>
           <p:cNvCxnSpPr/>
           <p:nvPr/>
         </p:nvCxnSpPr>
         <p:spPr>
           <a:xfrm>
-            <a:off x="3811981" y="5530133"/>
+            <a:off x="4278909" y="5530133"/>
             <a:ext cx="320865" cy="340522"/>
           </a:xfrm>
           <a:prstGeom prst="line">
@@ -9179,14 +9590,14 @@
       </p:cxnSp>
       <p:cxnSp>
         <p:nvCxnSpPr>
-          <p:cNvPr id="614" name="Straight Connector 613"/>
+          <p:cNvPr id="578" name="Straight Connector 577"/>
           <p:cNvCxnSpPr/>
           <p:nvPr/>
         </p:nvCxnSpPr>
         <p:spPr>
           <a:xfrm>
-            <a:off x="1991149" y="5287171"/>
-            <a:ext cx="1335960" cy="446642"/>
+            <a:off x="2458077" y="5287171"/>
+            <a:ext cx="1275498" cy="426588"/>
           </a:xfrm>
           <a:prstGeom prst="line">
             <a:avLst/>
@@ -9215,13 +9626,13 @@
       </p:cxnSp>
       <p:grpSp>
         <p:nvGrpSpPr>
-          <p:cNvPr id="615" name="Group 614"/>
+          <p:cNvPr id="579" name="Group 578"/>
           <p:cNvGrpSpPr/>
           <p:nvPr/>
         </p:nvGrpSpPr>
         <p:grpSpPr>
           <a:xfrm>
-            <a:off x="2784650" y="4895033"/>
+            <a:off x="3251578" y="4895033"/>
             <a:ext cx="1027331" cy="507144"/>
             <a:chOff x="2923397" y="2739646"/>
             <a:chExt cx="1027331" cy="507144"/>
@@ -9229,7 +9640,7 @@
         </p:grpSpPr>
         <p:sp>
           <p:nvSpPr>
-            <p:cNvPr id="616" name="Pentagon 615"/>
+            <p:cNvPr id="580" name="Pentagon 579"/>
             <p:cNvSpPr/>
             <p:nvPr/>
           </p:nvSpPr>
@@ -9276,7 +9687,7 @@
         </p:sp>
         <p:sp>
           <p:nvSpPr>
-            <p:cNvPr id="617" name="Rectangle 616"/>
+            <p:cNvPr id="581" name="Rectangle 580"/>
             <p:cNvSpPr/>
             <p:nvPr/>
           </p:nvSpPr>
@@ -9307,13 +9718,13 @@
       </p:grpSp>
       <p:cxnSp>
         <p:nvCxnSpPr>
-          <p:cNvPr id="618" name="Straight Connector 617"/>
+          <p:cNvPr id="582" name="Straight Connector 581"/>
           <p:cNvCxnSpPr/>
           <p:nvPr/>
         </p:nvCxnSpPr>
         <p:spPr>
           <a:xfrm>
-            <a:off x="2537774" y="5288817"/>
+            <a:off x="3004702" y="5288817"/>
             <a:ext cx="1274207" cy="239638"/>
           </a:xfrm>
           <a:prstGeom prst="line">
@@ -9343,14 +9754,14 @@
       </p:cxnSp>
       <p:cxnSp>
         <p:nvCxnSpPr>
-          <p:cNvPr id="619" name="Straight Connector 618"/>
+          <p:cNvPr id="583" name="Straight Connector 582"/>
           <p:cNvCxnSpPr/>
           <p:nvPr/>
         </p:nvCxnSpPr>
         <p:spPr>
           <a:xfrm>
-            <a:off x="3470955" y="5290018"/>
-            <a:ext cx="775221" cy="209565"/>
+            <a:off x="3962860" y="5304439"/>
+            <a:ext cx="750244" cy="211886"/>
           </a:xfrm>
           <a:prstGeom prst="line">
             <a:avLst/>
@@ -9377,6 +9788,222 @@
           </a:fontRef>
         </p:style>
       </p:cxnSp>
+      <p:cxnSp>
+        <p:nvCxnSpPr>
+          <p:cNvPr id="584" name="Straight Connector 583"/>
+          <p:cNvCxnSpPr/>
+          <p:nvPr/>
+        </p:nvCxnSpPr>
+        <p:spPr>
+          <a:xfrm>
+            <a:off x="4703656" y="5499583"/>
+            <a:ext cx="280131" cy="457411"/>
+          </a:xfrm>
+          <a:prstGeom prst="line">
+            <a:avLst/>
+          </a:prstGeom>
+          <a:ln>
+            <a:solidFill>
+              <a:srgbClr val="000000"/>
+            </a:solidFill>
+            <a:tailEnd type="triangle"/>
+          </a:ln>
+        </p:spPr>
+        <p:style>
+          <a:lnRef idx="1">
+            <a:schemeClr val="accent1"/>
+          </a:lnRef>
+          <a:fillRef idx="0">
+            <a:schemeClr val="accent1"/>
+          </a:fillRef>
+          <a:effectRef idx="0">
+            <a:schemeClr val="accent1"/>
+          </a:effectRef>
+          <a:fontRef idx="minor">
+            <a:schemeClr val="tx1"/>
+          </a:fontRef>
+        </p:style>
+      </p:cxnSp>
+      <p:sp>
+        <p:nvSpPr>
+          <p:cNvPr id="585" name="Rectangle 584"/>
+          <p:cNvSpPr/>
+          <p:nvPr/>
+        </p:nvSpPr>
+        <p:spPr>
+          <a:xfrm>
+            <a:off x="74413" y="2212358"/>
+            <a:ext cx="440006" cy="400110"/>
+          </a:xfrm>
+          <a:prstGeom prst="rect">
+            <a:avLst/>
+          </a:prstGeom>
+        </p:spPr>
+        <p:txBody>
+          <a:bodyPr wrap="square">
+            <a:spAutoFit/>
+          </a:bodyPr>
+          <a:lstStyle/>
+          <a:p>
+            <a:pPr algn="ctr"/>
+            <a:r>
+              <a:rPr lang="en-US" sz="2000" b="1"/>
+              <a:t>A</a:t>
+            </a:r>
+            <a:endParaRPr lang="en-US" sz="2000" b="1" dirty="0"/>
+          </a:p>
+        </p:txBody>
+      </p:sp>
+      <p:sp>
+        <p:nvSpPr>
+          <p:cNvPr id="586" name="Rectangle 585"/>
+          <p:cNvSpPr/>
+          <p:nvPr/>
+        </p:nvSpPr>
+        <p:spPr>
+          <a:xfrm>
+            <a:off x="74413" y="3808671"/>
+            <a:ext cx="440006" cy="400110"/>
+          </a:xfrm>
+          <a:prstGeom prst="rect">
+            <a:avLst/>
+          </a:prstGeom>
+        </p:spPr>
+        <p:txBody>
+          <a:bodyPr wrap="square">
+            <a:spAutoFit/>
+          </a:bodyPr>
+          <a:lstStyle/>
+          <a:p>
+            <a:pPr algn="ctr"/>
+            <a:r>
+              <a:rPr lang="en-US" sz="2000" b="1" smtClean="0"/>
+              <a:t>B</a:t>
+            </a:r>
+            <a:endParaRPr lang="en-US" sz="2000" b="1" dirty="0"/>
+          </a:p>
+        </p:txBody>
+      </p:sp>
+      <p:sp>
+        <p:nvSpPr>
+          <p:cNvPr id="587" name="Rectangle 586"/>
+          <p:cNvSpPr/>
+          <p:nvPr/>
+        </p:nvSpPr>
+        <p:spPr>
+          <a:xfrm>
+            <a:off x="74413" y="5395739"/>
+            <a:ext cx="440006" cy="400110"/>
+          </a:xfrm>
+          <a:prstGeom prst="rect">
+            <a:avLst/>
+          </a:prstGeom>
+        </p:spPr>
+        <p:txBody>
+          <a:bodyPr wrap="square">
+            <a:spAutoFit/>
+          </a:bodyPr>
+          <a:lstStyle/>
+          <a:p>
+            <a:pPr algn="ctr"/>
+            <a:r>
+              <a:rPr lang="en-US" sz="2000" b="1"/>
+              <a:t>C</a:t>
+            </a:r>
+            <a:endParaRPr lang="en-US" sz="2000" b="1" dirty="0"/>
+          </a:p>
+        </p:txBody>
+      </p:sp>
+      <p:sp>
+        <p:nvSpPr>
+          <p:cNvPr id="588" name="Rectangle 587"/>
+          <p:cNvSpPr/>
+          <p:nvPr/>
+        </p:nvSpPr>
+        <p:spPr>
+          <a:xfrm>
+            <a:off x="74413" y="6887895"/>
+            <a:ext cx="440006" cy="400110"/>
+          </a:xfrm>
+          <a:prstGeom prst="rect">
+            <a:avLst/>
+          </a:prstGeom>
+        </p:spPr>
+        <p:txBody>
+          <a:bodyPr wrap="square">
+            <a:spAutoFit/>
+          </a:bodyPr>
+          <a:lstStyle/>
+          <a:p>
+            <a:pPr algn="ctr"/>
+            <a:r>
+              <a:rPr lang="en-US" sz="2000" b="1" smtClean="0"/>
+              <a:t>D</a:t>
+            </a:r>
+            <a:endParaRPr lang="en-US" sz="2000" b="1" dirty="0"/>
+          </a:p>
+        </p:txBody>
+      </p:sp>
+      <p:sp>
+        <p:nvSpPr>
+          <p:cNvPr id="589" name="Rectangle 588"/>
+          <p:cNvSpPr/>
+          <p:nvPr/>
+        </p:nvSpPr>
+        <p:spPr>
+          <a:xfrm>
+            <a:off x="74413" y="8456699"/>
+            <a:ext cx="440006" cy="400110"/>
+          </a:xfrm>
+          <a:prstGeom prst="rect">
+            <a:avLst/>
+          </a:prstGeom>
+        </p:spPr>
+        <p:txBody>
+          <a:bodyPr wrap="square">
+            <a:spAutoFit/>
+          </a:bodyPr>
+          <a:lstStyle/>
+          <a:p>
+            <a:pPr algn="ctr"/>
+            <a:r>
+              <a:rPr lang="en-US" sz="2000" b="1"/>
+              <a:t>E</a:t>
+            </a:r>
+            <a:endParaRPr lang="en-US" sz="2000" b="1" dirty="0"/>
+          </a:p>
+        </p:txBody>
+      </p:sp>
+      <p:sp>
+        <p:nvSpPr>
+          <p:cNvPr id="590" name="Rectangle 589"/>
+          <p:cNvSpPr/>
+          <p:nvPr/>
+        </p:nvSpPr>
+        <p:spPr>
+          <a:xfrm>
+            <a:off x="74413" y="10012533"/>
+            <a:ext cx="440006" cy="400110"/>
+          </a:xfrm>
+          <a:prstGeom prst="rect">
+            <a:avLst/>
+          </a:prstGeom>
+        </p:spPr>
+        <p:txBody>
+          <a:bodyPr wrap="square">
+            <a:spAutoFit/>
+          </a:bodyPr>
+          <a:lstStyle/>
+          <a:p>
+            <a:pPr algn="ctr"/>
+            <a:r>
+              <a:rPr lang="en-US" sz="2000" b="1" dirty="0" smtClean="0"/>
+              <a:t>F</a:t>
+            </a:r>
+            <a:endParaRPr lang="en-US" sz="2000" b="1" dirty="0"/>
+          </a:p>
+        </p:txBody>
+      </p:sp>
     </p:spTree>
     <p:extLst>
       <p:ext uri="{BB962C8B-B14F-4D97-AF65-F5344CB8AC3E}">

</xml_diff>